<commit_message>
File movement and small updates
</commit_message>
<xml_diff>
--- a/AOPwiki_analysis_ccs.pptx
+++ b/AOPwiki_analysis_ccs.pptx
@@ -7,8 +7,8 @@
   <p:sldIdLst>
     <p:sldId id="256" r:id="rId2"/>
     <p:sldId id="257" r:id="rId3"/>
-    <p:sldId id="258" r:id="rId4"/>
-    <p:sldId id="259" r:id="rId5"/>
+    <p:sldId id="260" r:id="rId4"/>
+    <p:sldId id="261" r:id="rId5"/>
   </p:sldIdLst>
   <p:sldSz cx="12192000" cy="6858000"/>
   <p:notesSz cx="6858000" cy="9144000"/>
@@ -107,6 +107,11 @@
       </a:defRPr>
     </a:lvl9pPr>
   </p:defaultTextStyle>
+  <p:extLst>
+    <p:ext uri="{EFAFB233-063F-42B5-8137-9DF3F51BA10A}">
+      <p15:sldGuideLst xmlns:p15="http://schemas.microsoft.com/office/powerpoint/2012/main"/>
+    </p:ext>
+  </p:extLst>
 </p:presentation>
 </file>
 
@@ -241,7 +246,7 @@
           <a:p>
             <a:fld id="{C71581C8-DC5B-4BAA-A235-D61CE073C796}" type="datetimeFigureOut">
               <a:rPr lang="en-US" smtClean="0"/>
-              <a:t>5/11/2017</a:t>
+              <a:t>5/12/2017</a:t>
             </a:fld>
             <a:endParaRPr lang="en-US"/>
           </a:p>
@@ -416,7 +421,7 @@
           <a:p>
             <a:fld id="{C71581C8-DC5B-4BAA-A235-D61CE073C796}" type="datetimeFigureOut">
               <a:rPr lang="en-US" smtClean="0"/>
-              <a:t>5/11/2017</a:t>
+              <a:t>5/12/2017</a:t>
             </a:fld>
             <a:endParaRPr lang="en-US"/>
           </a:p>
@@ -596,7 +601,7 @@
           <a:p>
             <a:fld id="{C71581C8-DC5B-4BAA-A235-D61CE073C796}" type="datetimeFigureOut">
               <a:rPr lang="en-US" smtClean="0"/>
-              <a:t>5/11/2017</a:t>
+              <a:t>5/12/2017</a:t>
             </a:fld>
             <a:endParaRPr lang="en-US"/>
           </a:p>
@@ -771,7 +776,7 @@
           <a:p>
             <a:fld id="{C71581C8-DC5B-4BAA-A235-D61CE073C796}" type="datetimeFigureOut">
               <a:rPr lang="en-US" smtClean="0"/>
-              <a:t>5/11/2017</a:t>
+              <a:t>5/12/2017</a:t>
             </a:fld>
             <a:endParaRPr lang="en-US"/>
           </a:p>
@@ -1017,7 +1022,7 @@
           <a:p>
             <a:fld id="{C71581C8-DC5B-4BAA-A235-D61CE073C796}" type="datetimeFigureOut">
               <a:rPr lang="en-US" smtClean="0"/>
-              <a:t>5/11/2017</a:t>
+              <a:t>5/12/2017</a:t>
             </a:fld>
             <a:endParaRPr lang="en-US"/>
           </a:p>
@@ -1254,7 +1259,7 @@
           <a:p>
             <a:fld id="{C71581C8-DC5B-4BAA-A235-D61CE073C796}" type="datetimeFigureOut">
               <a:rPr lang="en-US" smtClean="0"/>
-              <a:t>5/11/2017</a:t>
+              <a:t>5/12/2017</a:t>
             </a:fld>
             <a:endParaRPr lang="en-US"/>
           </a:p>
@@ -1621,7 +1626,7 @@
           <a:p>
             <a:fld id="{C71581C8-DC5B-4BAA-A235-D61CE073C796}" type="datetimeFigureOut">
               <a:rPr lang="en-US" smtClean="0"/>
-              <a:t>5/11/2017</a:t>
+              <a:t>5/12/2017</a:t>
             </a:fld>
             <a:endParaRPr lang="en-US"/>
           </a:p>
@@ -1739,7 +1744,7 @@
           <a:p>
             <a:fld id="{C71581C8-DC5B-4BAA-A235-D61CE073C796}" type="datetimeFigureOut">
               <a:rPr lang="en-US" smtClean="0"/>
-              <a:t>5/11/2017</a:t>
+              <a:t>5/12/2017</a:t>
             </a:fld>
             <a:endParaRPr lang="en-US"/>
           </a:p>
@@ -1834,7 +1839,7 @@
           <a:p>
             <a:fld id="{C71581C8-DC5B-4BAA-A235-D61CE073C796}" type="datetimeFigureOut">
               <a:rPr lang="en-US" smtClean="0"/>
-              <a:t>5/11/2017</a:t>
+              <a:t>5/12/2017</a:t>
             </a:fld>
             <a:endParaRPr lang="en-US"/>
           </a:p>
@@ -2111,7 +2116,7 @@
           <a:p>
             <a:fld id="{C71581C8-DC5B-4BAA-A235-D61CE073C796}" type="datetimeFigureOut">
               <a:rPr lang="en-US" smtClean="0"/>
-              <a:t>5/11/2017</a:t>
+              <a:t>5/12/2017</a:t>
             </a:fld>
             <a:endParaRPr lang="en-US"/>
           </a:p>
@@ -2368,7 +2373,7 @@
           <a:p>
             <a:fld id="{C71581C8-DC5B-4BAA-A235-D61CE073C796}" type="datetimeFigureOut">
               <a:rPr lang="en-US" smtClean="0"/>
-              <a:t>5/11/2017</a:t>
+              <a:t>5/12/2017</a:t>
             </a:fld>
             <a:endParaRPr lang="en-US"/>
           </a:p>
@@ -2581,7 +2586,7 @@
           <a:p>
             <a:fld id="{C71581C8-DC5B-4BAA-A235-D61CE073C796}" type="datetimeFigureOut">
               <a:rPr lang="en-US" smtClean="0"/>
-              <a:t>5/11/2017</a:t>
+              <a:t>5/12/2017</a:t>
             </a:fld>
             <a:endParaRPr lang="en-US"/>
           </a:p>
@@ -3034,7 +3039,7 @@
           <a:p>
             <a:r>
               <a:rPr lang="en-US" dirty="0"/>
-              <a:t>Nate Pollesch and Jason O’Brien</a:t>
+              <a:t>Nate Pollesch, Jason O’Brien, …</a:t>
             </a:r>
           </a:p>
         </p:txBody>
@@ -3081,30 +3086,69 @@
         </p:nvSpPr>
         <p:spPr/>
         <p:txBody>
+          <a:bodyPr vert="horz" lIns="91440" tIns="45720" rIns="91440" bIns="45720" rtlCol="0" anchor="b">
+            <a:normAutofit/>
+          </a:bodyPr>
+          <a:lstStyle/>
+          <a:p>
+            <a:r>
+              <a:rPr lang="en-US" sz="4000" dirty="0"/>
+              <a:t>The </a:t>
+            </a:r>
+            <a:r>
+              <a:rPr lang="en-US" sz="4000" dirty="0" err="1"/>
+              <a:t>AOPWiki</a:t>
+            </a:r>
+            <a:r>
+              <a:rPr lang="en-US" sz="4000" dirty="0"/>
+              <a:t> Network</a:t>
+            </a:r>
+          </a:p>
+        </p:txBody>
+      </p:sp>
+      <p:sp>
+        <p:nvSpPr>
+          <p:cNvPr id="16" name="Text Placeholder 15"/>
+          <p:cNvSpPr>
+            <a:spLocks noGrp="1"/>
+          </p:cNvSpPr>
+          <p:nvPr>
+            <p:ph type="body" sz="half" idx="2"/>
+          </p:nvPr>
+        </p:nvSpPr>
+        <p:spPr/>
+        <p:txBody>
           <a:bodyPr/>
           <a:lstStyle/>
           <a:p>
             <a:r>
               <a:rPr lang="en-US" dirty="0"/>
-              <a:t>The </a:t>
-            </a:r>
-            <a:r>
-              <a:rPr lang="en-US" dirty="0" err="1"/>
-              <a:t>AOPWiki</a:t>
-            </a:r>
-            <a:endParaRPr lang="en-US" dirty="0"/>
+              <a:t>A network diagram of the Adverse Outcome Pathway Wiki database of AOPs. </a:t>
+            </a:r>
+          </a:p>
+          <a:p>
+            <a:r>
+              <a:rPr lang="en-US" dirty="0"/>
+              <a:t>As of: April 10</a:t>
+            </a:r>
+            <a:r>
+              <a:rPr lang="en-US" baseline="30000" dirty="0"/>
+              <a:t>th</a:t>
+            </a:r>
+            <a:r>
+              <a:rPr lang="en-US" dirty="0"/>
+              <a:t>, 2017</a:t>
+            </a:r>
           </a:p>
         </p:txBody>
       </p:sp>
       <p:pic>
         <p:nvPicPr>
-          <p:cNvPr id="4" name="Content Placeholder 3" descr="Screen Clipping"/>
+          <p:cNvPr id="17" name="Content Placeholder 3" descr="Screen Clipping"/>
           <p:cNvPicPr>
-            <a:picLocks noGrp="1" noChangeAspect="1"/>
+            <a:picLocks noChangeAspect="1"/>
           </p:cNvPicPr>
-          <p:nvPr>
-            <p:ph idx="1"/>
-          </p:nvPr>
+          <p:nvPr/>
         </p:nvPicPr>
         <p:blipFill>
           <a:blip r:embed="rId2">
@@ -3120,9 +3164,12 @@
         </p:blipFill>
         <p:spPr>
           <a:xfrm>
-            <a:off x="3846067" y="1444625"/>
-            <a:ext cx="4499866" cy="4351338"/>
+            <a:off x="5429324" y="247593"/>
+            <a:ext cx="6598368" cy="6383919"/>
           </a:xfrm>
+          <a:prstGeom prst="rect">
+            <a:avLst/>
+          </a:prstGeom>
         </p:spPr>
       </p:pic>
     </p:spTree>
@@ -3165,23 +3212,86 @@
             <p:ph type="title"/>
           </p:nvPr>
         </p:nvSpPr>
-        <p:spPr/>
+        <p:spPr>
+          <a:xfrm>
+            <a:off x="7425414" y="622630"/>
+            <a:ext cx="3932237" cy="1600200"/>
+          </a:xfrm>
+        </p:spPr>
+        <p:txBody>
+          <a:bodyPr vert="horz" lIns="91440" tIns="45720" rIns="91440" bIns="45720" rtlCol="0" anchor="b">
+            <a:normAutofit/>
+          </a:bodyPr>
+          <a:lstStyle/>
+          <a:p>
+            <a:r>
+              <a:rPr lang="en-US" sz="4000" dirty="0"/>
+              <a:t>The </a:t>
+            </a:r>
+            <a:r>
+              <a:rPr lang="en-US" sz="4000" dirty="0" err="1"/>
+              <a:t>AOPWiki</a:t>
+            </a:r>
+            <a:endParaRPr lang="en-US" sz="4000" dirty="0"/>
+          </a:p>
+        </p:txBody>
+      </p:sp>
+      <p:sp>
+        <p:nvSpPr>
+          <p:cNvPr id="16" name="Text Placeholder 15"/>
+          <p:cNvSpPr>
+            <a:spLocks noGrp="1"/>
+          </p:cNvSpPr>
+          <p:nvPr>
+            <p:ph type="body" sz="half" idx="2"/>
+          </p:nvPr>
+        </p:nvSpPr>
+        <p:spPr>
+          <a:xfrm>
+            <a:off x="7425414" y="2222830"/>
+            <a:ext cx="3932237" cy="3811588"/>
+          </a:xfrm>
+        </p:spPr>
         <p:txBody>
           <a:bodyPr/>
           <a:lstStyle/>
           <a:p>
             <a:r>
               <a:rPr lang="en-US" dirty="0"/>
-              <a:t>The </a:t>
+              <a:t>A network diagram of the Adverse Outcome Pathway Wiki database of AOPs. </a:t>
+            </a:r>
+          </a:p>
+          <a:p>
+            <a:r>
+              <a:rPr lang="en-US" dirty="0"/>
+              <a:t>In this figure, colors highlight distinct weakly connected components where an undirected path can be found between any nodes within the component (check </a:t>
             </a:r>
             <a:r>
               <a:rPr lang="en-US" dirty="0" err="1"/>
-              <a:t>AOPWiki</a:t>
+              <a:t>def’n</a:t>
             </a:r>
             <a:r>
               <a:rPr lang="en-US" dirty="0"/>
-              <a:t> - Colored by weakly connected components</a:t>
-            </a:r>
+              <a:t>).</a:t>
+            </a:r>
+          </a:p>
+          <a:p>
+            <a:r>
+              <a:rPr lang="en-US" dirty="0"/>
+              <a:t>Within the AOP context, weakly connected components highlight AOP networks where at least one key event relationships.</a:t>
+            </a:r>
+          </a:p>
+          <a:p>
+            <a:endParaRPr lang="en-US" dirty="0"/>
+          </a:p>
+          <a:p>
+            <a:endParaRPr lang="en-US" dirty="0"/>
+          </a:p>
+          <a:p>
+            <a:endParaRPr lang="en-US" dirty="0"/>
+          </a:p>
+          <a:p>
+            <a:endParaRPr lang="en-US" dirty="0"/>
           </a:p>
         </p:txBody>
       </p:sp>
@@ -3209,45 +3319,15 @@
         </p:blipFill>
         <p:spPr>
           <a:xfrm>
-            <a:off x="3928531" y="1368425"/>
-            <a:ext cx="4334938" cy="4351338"/>
+            <a:off x="262647" y="126519"/>
+            <a:ext cx="6527259" cy="6551952"/>
           </a:xfrm>
         </p:spPr>
       </p:pic>
-      <p:sp>
-        <p:nvSpPr>
-          <p:cNvPr id="6" name="TextBox 5"/>
-          <p:cNvSpPr txBox="1"/>
-          <p:nvPr/>
-        </p:nvSpPr>
-        <p:spPr>
-          <a:xfrm>
-            <a:off x="1733550" y="5992297"/>
-            <a:ext cx="8724900" cy="369332"/>
-          </a:xfrm>
-          <a:prstGeom prst="rect">
-            <a:avLst/>
-          </a:prstGeom>
-          <a:noFill/>
-        </p:spPr>
-        <p:txBody>
-          <a:bodyPr wrap="square" rtlCol="0">
-            <a:spAutoFit/>
-          </a:bodyPr>
-          <a:lstStyle/>
-          <a:p>
-            <a:pPr algn="ctr"/>
-            <a:r>
-              <a:rPr lang="en-US" dirty="0"/>
-              <a:t>Weakly connected components represent distinct AOP networks within the wiki</a:t>
-            </a:r>
-          </a:p>
-        </p:txBody>
-      </p:sp>
     </p:spTree>
     <p:extLst>
       <p:ext uri="{BB962C8B-B14F-4D97-AF65-F5344CB8AC3E}">
-        <p14:creationId xmlns:p14="http://schemas.microsoft.com/office/powerpoint/2010/main" val="212461851"/>
+        <p14:creationId xmlns:p14="http://schemas.microsoft.com/office/powerpoint/2010/main" val="1492238267"/>
       </p:ext>
     </p:extLst>
   </p:cSld>
@@ -3286,35 +3366,76 @@
         </p:nvSpPr>
         <p:spPr/>
         <p:txBody>
-          <a:bodyPr>
+          <a:bodyPr vert="horz" lIns="91440" tIns="45720" rIns="91440" bIns="45720" rtlCol="0" anchor="b">
             <a:normAutofit/>
           </a:bodyPr>
           <a:lstStyle/>
           <a:p>
             <a:r>
+              <a:rPr lang="en-US" sz="4000" dirty="0"/>
+              <a:t>The </a:t>
+            </a:r>
+            <a:r>
+              <a:rPr lang="en-US" sz="4000" dirty="0" err="1"/>
+              <a:t>AOPWiki</a:t>
+            </a:r>
+            <a:endParaRPr lang="en-US" sz="4000" dirty="0"/>
+          </a:p>
+        </p:txBody>
+      </p:sp>
+      <p:sp>
+        <p:nvSpPr>
+          <p:cNvPr id="16" name="Text Placeholder 15"/>
+          <p:cNvSpPr>
+            <a:spLocks noGrp="1"/>
+          </p:cNvSpPr>
+          <p:nvPr>
+            <p:ph type="body" sz="half" idx="2"/>
+          </p:nvPr>
+        </p:nvSpPr>
+        <p:spPr/>
+        <p:txBody>
+          <a:bodyPr/>
+          <a:lstStyle/>
+          <a:p>
+            <a:r>
               <a:rPr lang="en-US" dirty="0"/>
-              <a:t>The </a:t>
-            </a:r>
-            <a:r>
-              <a:rPr lang="en-US" dirty="0" err="1"/>
-              <a:t>AOPWiki</a:t>
-            </a:r>
+              <a:t>A network diagram of the Adverse Outcome Pathway Wiki database of AOPs. </a:t>
+            </a:r>
+          </a:p>
+          <a:p>
             <a:r>
               <a:rPr lang="en-US" dirty="0"/>
-              <a:t> - Colored by strongly connected components</a:t>
-            </a:r>
+              <a:t>In this figure, colors highlight distinct strongly connected components.  Nodes within strongly connected components have a directed path to each other node in the network.</a:t>
+            </a:r>
+          </a:p>
+          <a:p>
+            <a:r>
+              <a:rPr lang="en-US" dirty="0"/>
+              <a:t>Within the AOP context, a strongly connected component highlights cycles or feedback loops between Key Events.</a:t>
+            </a:r>
+          </a:p>
+          <a:p>
+            <a:endParaRPr lang="en-US" dirty="0"/>
+          </a:p>
+          <a:p>
+            <a:endParaRPr lang="en-US" dirty="0"/>
+          </a:p>
+          <a:p>
+            <a:endParaRPr lang="en-US" dirty="0"/>
+          </a:p>
+          <a:p>
+            <a:endParaRPr lang="en-US" dirty="0"/>
           </a:p>
         </p:txBody>
       </p:sp>
       <p:pic>
         <p:nvPicPr>
-          <p:cNvPr id="7" name="Content Placeholder 6" descr="Screen Clipping"/>
+          <p:cNvPr id="17" name="Content Placeholder 3" descr="Screen Clipping"/>
           <p:cNvPicPr>
-            <a:picLocks noGrp="1" noChangeAspect="1"/>
+            <a:picLocks noChangeAspect="1"/>
           </p:cNvPicPr>
-          <p:nvPr>
-            <p:ph idx="1"/>
-          </p:nvPr>
+          <p:nvPr/>
         </p:nvPicPr>
         <p:blipFill>
           <a:blip r:embed="rId2">
@@ -3330,50 +3451,47 @@
         </p:blipFill>
         <p:spPr>
           <a:xfrm>
-            <a:off x="3920331" y="1368425"/>
-            <a:ext cx="4351338" cy="4351338"/>
-          </a:xfrm>
-        </p:spPr>
-      </p:pic>
-      <p:sp>
-        <p:nvSpPr>
-          <p:cNvPr id="8" name="TextBox 7"/>
-          <p:cNvSpPr txBox="1"/>
-          <p:nvPr/>
-        </p:nvSpPr>
-        <p:spPr>
-          <a:xfrm>
-            <a:off x="1733550" y="5992297"/>
-            <a:ext cx="8724900" cy="646331"/>
+            <a:off x="5429324" y="247593"/>
+            <a:ext cx="6598368" cy="6383919"/>
           </a:xfrm>
           <a:prstGeom prst="rect">
             <a:avLst/>
           </a:prstGeom>
-          <a:noFill/>
         </p:spPr>
-        <p:txBody>
-          <a:bodyPr wrap="square" rtlCol="0">
-            <a:spAutoFit/>
-          </a:bodyPr>
-          <a:lstStyle/>
-          <a:p>
-            <a:pPr algn="ctr"/>
-            <a:r>
-              <a:rPr lang="en-US" dirty="0"/>
-              <a:t>Strongly connected components represent cycles or feedback loops within AOP networks within </a:t>
-            </a:r>
-            <a:r>
-              <a:rPr lang="en-US"/>
-              <a:t>the wiki</a:t>
-            </a:r>
-            <a:endParaRPr lang="en-US" dirty="0"/>
-          </a:p>
-        </p:txBody>
-      </p:sp>
+      </p:pic>
+      <p:pic>
+        <p:nvPicPr>
+          <p:cNvPr id="5" name="Content Placeholder 6" descr="Screen Clipping"/>
+          <p:cNvPicPr>
+            <a:picLocks noGrp="1" noChangeAspect="1"/>
+          </p:cNvPicPr>
+          <p:nvPr>
+            <p:ph idx="1"/>
+          </p:nvPr>
+        </p:nvPicPr>
+        <p:blipFill>
+          <a:blip r:embed="rId3">
+            <a:extLst>
+              <a:ext uri="{28A0092B-C50C-407E-A947-70E740481C1C}">
+                <a14:useLocalDpi xmlns:a14="http://schemas.microsoft.com/office/drawing/2010/main" val="0"/>
+              </a:ext>
+            </a:extLst>
+          </a:blip>
+          <a:stretch>
+            <a:fillRect/>
+          </a:stretch>
+        </p:blipFill>
+        <p:spPr>
+          <a:xfrm>
+            <a:off x="5429324" y="123065"/>
+            <a:ext cx="6632973" cy="6632973"/>
+          </a:xfrm>
+        </p:spPr>
+      </p:pic>
     </p:spTree>
     <p:extLst>
       <p:ext uri="{BB962C8B-B14F-4D97-AF65-F5344CB8AC3E}">
-        <p14:creationId xmlns:p14="http://schemas.microsoft.com/office/powerpoint/2010/main" val="1548633340"/>
+        <p14:creationId xmlns:p14="http://schemas.microsoft.com/office/powerpoint/2010/main" val="1706549562"/>
       </p:ext>
     </p:extLst>
   </p:cSld>

</xml_diff>

<commit_message>
New plots and analyses
</commit_message>
<xml_diff>
--- a/AOPwiki_analysis_ccs.pptx
+++ b/AOPwiki_analysis_ccs.pptx
@@ -9,6 +9,7 @@
     <p:sldId id="257" r:id="rId3"/>
     <p:sldId id="260" r:id="rId4"/>
     <p:sldId id="261" r:id="rId5"/>
+    <p:sldId id="262" r:id="rId6"/>
   </p:sldIdLst>
   <p:sldSz cx="12192000" cy="6858000"/>
   <p:notesSz cx="6858000" cy="9144000"/>
@@ -108,6 +109,19 @@
     </a:lvl9pPr>
   </p:defaultTextStyle>
   <p:extLst>
+    <p:ext uri="{521415D9-36F7-43E2-AB2F-B90AF26B5E84}">
+      <p14:sectionLst xmlns:p14="http://schemas.microsoft.com/office/powerpoint/2010/main">
+        <p14:section name="Default Section" id="{0A200C3D-1553-467D-B607-12D7706B5652}">
+          <p14:sldIdLst>
+            <p14:sldId id="256"/>
+            <p14:sldId id="257"/>
+            <p14:sldId id="260"/>
+            <p14:sldId id="261"/>
+            <p14:sldId id="262"/>
+          </p14:sldIdLst>
+        </p14:section>
+      </p14:sectionLst>
+    </p:ext>
     <p:ext uri="{EFAFB233-063F-42B5-8137-9DF3F51BA10A}">
       <p15:sldGuideLst xmlns:p15="http://schemas.microsoft.com/office/powerpoint/2012/main"/>
     </p:ext>
@@ -3039,8 +3053,13 @@
           <a:p>
             <a:r>
               <a:rPr lang="en-US" dirty="0"/>
-              <a:t>Nate Pollesch, Jason O’Brien, …</a:t>
-            </a:r>
+              <a:t>Nate Pollesch, Jason O’Brien, and Dan </a:t>
+            </a:r>
+            <a:r>
+              <a:rPr lang="en-US" dirty="0" err="1"/>
+              <a:t>Villenueve</a:t>
+            </a:r>
+            <a:endParaRPr lang="en-US" dirty="0"/>
           </a:p>
         </p:txBody>
       </p:sp>
@@ -3084,7 +3103,12 @@
             <p:ph type="title"/>
           </p:nvPr>
         </p:nvSpPr>
-        <p:spPr/>
+        <p:spPr>
+          <a:xfrm>
+            <a:off x="839788" y="457200"/>
+            <a:ext cx="3932237" cy="2184400"/>
+          </a:xfrm>
+        </p:spPr>
         <p:txBody>
           <a:bodyPr vert="horz" lIns="91440" tIns="45720" rIns="91440" bIns="45720" rtlCol="0" anchor="b">
             <a:normAutofit/>
@@ -3093,11 +3117,11 @@
           <a:p>
             <a:r>
               <a:rPr lang="en-US" sz="4000" dirty="0"/>
-              <a:t>The </a:t>
+              <a:t>The Complete </a:t>
             </a:r>
             <a:r>
               <a:rPr lang="en-US" sz="4000" dirty="0" err="1"/>
-              <a:t>AOPWiki</a:t>
+              <a:t>AOPwiki</a:t>
             </a:r>
             <a:r>
               <a:rPr lang="en-US" sz="4000" dirty="0"/>
@@ -3116,7 +3140,12 @@
             <p:ph type="body" sz="half" idx="2"/>
           </p:nvPr>
         </p:nvSpPr>
-        <p:spPr/>
+        <p:spPr>
+          <a:xfrm>
+            <a:off x="839787" y="2641600"/>
+            <a:ext cx="3932237" cy="977900"/>
+          </a:xfrm>
+        </p:spPr>
         <p:txBody>
           <a:bodyPr/>
           <a:lstStyle/>
@@ -3164,8 +3193,8 @@
         </p:blipFill>
         <p:spPr>
           <a:xfrm>
-            <a:off x="5429324" y="247593"/>
-            <a:ext cx="6598368" cy="6383919"/>
+            <a:off x="5103626" y="0"/>
+            <a:ext cx="7088374" cy="6858000"/>
           </a:xfrm>
           <a:prstGeom prst="rect">
             <a:avLst/>
@@ -3220,19 +3249,22 @@
         </p:spPr>
         <p:txBody>
           <a:bodyPr vert="horz" lIns="91440" tIns="45720" rIns="91440" bIns="45720" rtlCol="0" anchor="b">
-            <a:normAutofit/>
+            <a:normAutofit fontScale="90000"/>
           </a:bodyPr>
           <a:lstStyle/>
           <a:p>
             <a:r>
               <a:rPr lang="en-US" sz="4000" dirty="0"/>
-              <a:t>The </a:t>
+              <a:t>Components of the </a:t>
             </a:r>
             <a:r>
               <a:rPr lang="en-US" sz="4000" dirty="0" err="1"/>
-              <a:t>AOPWiki</a:t>
-            </a:r>
-            <a:endParaRPr lang="en-US" sz="4000" dirty="0"/>
+              <a:t>AOPwiki</a:t>
+            </a:r>
+            <a:r>
+              <a:rPr lang="en-US" sz="4000" dirty="0"/>
+              <a:t> network</a:t>
+            </a:r>
           </a:p>
         </p:txBody>
       </p:sp>
@@ -3280,6 +3312,23 @@
               <a:rPr lang="en-US" dirty="0"/>
               <a:t>Within the AOP context, weakly connected components highlight AOP networks where at least one key event relationships.</a:t>
             </a:r>
+          </a:p>
+          <a:p>
+            <a:r>
+              <a:rPr lang="en-US" dirty="0"/>
+              <a:t>There are 34 weakly connected components in the </a:t>
+            </a:r>
+            <a:r>
+              <a:rPr lang="en-US" dirty="0" err="1"/>
+              <a:t>AOPwiki</a:t>
+            </a:r>
+            <a:r>
+              <a:rPr lang="en-US" dirty="0"/>
+              <a:t> network.  The largest has 494 key events in it, the smallest has 2.</a:t>
+            </a:r>
+          </a:p>
+          <a:p>
+            <a:endParaRPr lang="en-US" dirty="0"/>
           </a:p>
           <a:p>
             <a:endParaRPr lang="en-US" dirty="0"/>
@@ -3319,8 +3368,8 @@
         </p:blipFill>
         <p:spPr>
           <a:xfrm>
-            <a:off x="262647" y="126519"/>
-            <a:ext cx="6527259" cy="6551952"/>
+            <a:off x="190500" y="0"/>
+            <a:ext cx="6832600" cy="6858449"/>
           </a:xfrm>
         </p:spPr>
       </p:pic>
@@ -3367,19 +3416,22 @@
         <p:spPr/>
         <p:txBody>
           <a:bodyPr vert="horz" lIns="91440" tIns="45720" rIns="91440" bIns="45720" rtlCol="0" anchor="b">
-            <a:normAutofit/>
+            <a:normAutofit fontScale="90000"/>
           </a:bodyPr>
           <a:lstStyle/>
           <a:p>
             <a:r>
               <a:rPr lang="en-US" sz="4000" dirty="0"/>
-              <a:t>The </a:t>
+              <a:t>Components of the </a:t>
             </a:r>
             <a:r>
               <a:rPr lang="en-US" sz="4000" dirty="0" err="1"/>
-              <a:t>AOPWiki</a:t>
-            </a:r>
-            <a:endParaRPr lang="en-US" sz="4000" dirty="0"/>
+              <a:t>AOPwiki</a:t>
+            </a:r>
+            <a:r>
+              <a:rPr lang="en-US" sz="4000" dirty="0"/>
+              <a:t> network</a:t>
+            </a:r>
           </a:p>
         </p:txBody>
       </p:sp>
@@ -3413,6 +3465,20 @@
             <a:r>
               <a:rPr lang="en-US" dirty="0"/>
               <a:t>Within the AOP context, a strongly connected component highlights cycles or feedback loops between Key Events.</a:t>
+            </a:r>
+          </a:p>
+          <a:p>
+            <a:r>
+              <a:rPr lang="en-US" dirty="0"/>
+              <a:t>In the </a:t>
+            </a:r>
+            <a:r>
+              <a:rPr lang="en-US" dirty="0" err="1"/>
+              <a:t>AOPwiki</a:t>
+            </a:r>
+            <a:r>
+              <a:rPr lang="en-US" dirty="0"/>
+              <a:t> network there are 7 distinct cycles that emerge.</a:t>
             </a:r>
           </a:p>
           <a:p>
@@ -3469,8 +3535,66 @@
             <p:ph idx="1"/>
           </p:nvPr>
         </p:nvPicPr>
+        <p:blipFill rotWithShape="1">
+          <a:blip r:embed="rId3">
+            <a:extLst>
+              <a:ext uri="{28A0092B-C50C-407E-A947-70E740481C1C}">
+                <a14:useLocalDpi xmlns:a14="http://schemas.microsoft.com/office/drawing/2010/main" val="0"/>
+              </a:ext>
+            </a:extLst>
+          </a:blip>
+          <a:srcRect b="2703"/>
+          <a:stretch/>
+        </p:blipFill>
+        <p:spPr>
+          <a:xfrm>
+            <a:off x="5143500" y="0"/>
+            <a:ext cx="7048500" cy="6858000"/>
+          </a:xfrm>
+        </p:spPr>
+      </p:pic>
+    </p:spTree>
+    <p:extLst>
+      <p:ext uri="{BB962C8B-B14F-4D97-AF65-F5344CB8AC3E}">
+        <p14:creationId xmlns:p14="http://schemas.microsoft.com/office/powerpoint/2010/main" val="1706549562"/>
+      </p:ext>
+    </p:extLst>
+  </p:cSld>
+  <p:clrMapOvr>
+    <a:masterClrMapping/>
+  </p:clrMapOvr>
+</p:sld>
+</file>
+
+<file path=ppt/slides/slide5.xml><?xml version="1.0" encoding="utf-8"?>
+<p:sld xmlns:a="http://schemas.openxmlformats.org/drawingml/2006/main" xmlns:r="http://schemas.openxmlformats.org/officeDocument/2006/relationships" xmlns:p="http://schemas.openxmlformats.org/presentationml/2006/main">
+  <p:cSld>
+    <p:spTree>
+      <p:nvGrpSpPr>
+        <p:cNvPr id="1" name=""/>
+        <p:cNvGrpSpPr/>
+        <p:nvPr/>
+      </p:nvGrpSpPr>
+      <p:grpSpPr>
+        <a:xfrm>
+          <a:off x="0" y="0"/>
+          <a:ext cx="0" cy="0"/>
+          <a:chOff x="0" y="0"/>
+          <a:chExt cx="0" cy="0"/>
+        </a:xfrm>
+      </p:grpSpPr>
+      <p:pic>
+        <p:nvPicPr>
+          <p:cNvPr id="22" name="Content Placeholder 21" descr="Screen Clipping"/>
+          <p:cNvPicPr>
+            <a:picLocks noGrp="1" noChangeAspect="1"/>
+          </p:cNvPicPr>
+          <p:nvPr>
+            <p:ph idx="1"/>
+          </p:nvPr>
+        </p:nvPicPr>
         <p:blipFill>
-          <a:blip r:embed="rId3">
+          <a:blip r:embed="rId2">
             <a:extLst>
               <a:ext uri="{28A0092B-C50C-407E-A947-70E740481C1C}">
                 <a14:useLocalDpi xmlns:a14="http://schemas.microsoft.com/office/drawing/2010/main" val="0"/>
@@ -3483,15 +3607,498 @@
         </p:blipFill>
         <p:spPr>
           <a:xfrm>
-            <a:off x="5429324" y="123065"/>
-            <a:ext cx="6632973" cy="6632973"/>
+            <a:off x="4798" y="1"/>
+            <a:ext cx="7075140" cy="6858000"/>
           </a:xfrm>
+        </p:spPr>
+      </p:pic>
+      <p:grpSp>
+        <p:nvGrpSpPr>
+          <p:cNvPr id="20" name="Group 19"/>
+          <p:cNvGrpSpPr/>
+          <p:nvPr/>
+        </p:nvGrpSpPr>
+        <p:grpSpPr>
+          <a:xfrm>
+            <a:off x="7357180" y="3256822"/>
+            <a:ext cx="4685791" cy="3480522"/>
+            <a:chOff x="7070830" y="3144272"/>
+            <a:chExt cx="4685791" cy="3480522"/>
+          </a:xfrm>
+        </p:grpSpPr>
+        <p:grpSp>
+          <p:nvGrpSpPr>
+            <p:cNvPr id="13" name="Group 12"/>
+            <p:cNvGrpSpPr/>
+            <p:nvPr/>
+          </p:nvGrpSpPr>
+          <p:grpSpPr>
+            <a:xfrm>
+              <a:off x="7070830" y="3144272"/>
+              <a:ext cx="4660391" cy="3480522"/>
+              <a:chOff x="911330" y="2877572"/>
+              <a:chExt cx="4660391" cy="3480522"/>
+            </a:xfrm>
+          </p:grpSpPr>
+          <p:pic>
+            <p:nvPicPr>
+              <p:cNvPr id="10" name="Picture 9" descr="Screen Clipping"/>
+              <p:cNvPicPr>
+                <a:picLocks noChangeAspect="1"/>
+              </p:cNvPicPr>
+              <p:nvPr/>
+            </p:nvPicPr>
+            <p:blipFill>
+              <a:blip r:embed="rId3">
+                <a:extLst>
+                  <a:ext uri="{28A0092B-C50C-407E-A947-70E740481C1C}">
+                    <a14:useLocalDpi xmlns:a14="http://schemas.microsoft.com/office/drawing/2010/main" val="0"/>
+                  </a:ext>
+                </a:extLst>
+              </a:blip>
+              <a:stretch>
+                <a:fillRect/>
+              </a:stretch>
+            </p:blipFill>
+            <p:spPr>
+              <a:xfrm>
+                <a:off x="1268287" y="2877572"/>
+                <a:ext cx="4303434" cy="3111190"/>
+              </a:xfrm>
+              <a:prstGeom prst="rect">
+                <a:avLst/>
+              </a:prstGeom>
+            </p:spPr>
+          </p:pic>
+          <p:sp>
+            <p:nvSpPr>
+              <p:cNvPr id="11" name="TextBox 10"/>
+              <p:cNvSpPr txBox="1"/>
+              <p:nvPr/>
+            </p:nvSpPr>
+            <p:spPr>
+              <a:xfrm>
+                <a:off x="911330" y="3098800"/>
+                <a:ext cx="461665" cy="1917699"/>
+              </a:xfrm>
+              <a:prstGeom prst="rect">
+                <a:avLst/>
+              </a:prstGeom>
+              <a:noFill/>
+            </p:spPr>
+            <p:txBody>
+              <a:bodyPr vert="vert270" wrap="square" rtlCol="0">
+                <a:spAutoFit/>
+              </a:bodyPr>
+              <a:lstStyle/>
+              <a:p>
+                <a:r>
+                  <a:rPr lang="en-US" dirty="0"/>
+                  <a:t>KE Occurrence</a:t>
+                </a:r>
+              </a:p>
+            </p:txBody>
+          </p:sp>
+          <mc:AlternateContent xmlns:mc="http://schemas.openxmlformats.org/markup-compatibility/2006">
+            <mc:Choice xmlns:a14="http://schemas.microsoft.com/office/drawing/2010/main" Requires="a14">
+              <p:sp>
+                <p:nvSpPr>
+                  <p:cNvPr id="12" name="TextBox 11"/>
+                  <p:cNvSpPr txBox="1"/>
+                  <p:nvPr/>
+                </p:nvSpPr>
+                <p:spPr>
+                  <a:xfrm>
+                    <a:off x="1754091" y="5988762"/>
+                    <a:ext cx="3331826" cy="369332"/>
+                  </a:xfrm>
+                  <a:prstGeom prst="rect">
+                    <a:avLst/>
+                  </a:prstGeom>
+                  <a:noFill/>
+                </p:spPr>
+                <p:txBody>
+                  <a:bodyPr vert="horz" wrap="square" rtlCol="0">
+                    <a:spAutoFit/>
+                  </a:bodyPr>
+                  <a:lstStyle/>
+                  <a:p>
+                    <a:r>
+                      <a:rPr lang="en-US" dirty="0"/>
+                      <a:t>Increasing level of organization </a:t>
+                    </a:r>
+                    <a14:m>
+                      <m:oMath xmlns:m="http://schemas.openxmlformats.org/officeDocument/2006/math">
+                        <m:r>
+                          <a:rPr lang="en-US" b="0" i="1" smtClean="0">
+                            <a:latin typeface="Cambria Math" panose="02040503050406030204" pitchFamily="18" charset="0"/>
+                          </a:rPr>
+                          <m:t>→</m:t>
+                        </m:r>
+                      </m:oMath>
+                    </a14:m>
+                    <a:endParaRPr lang="en-US" dirty="0"/>
+                  </a:p>
+                </p:txBody>
+              </p:sp>
+            </mc:Choice>
+            <mc:Fallback>
+              <p:sp>
+                <p:nvSpPr>
+                  <p:cNvPr id="12" name="TextBox 11"/>
+                  <p:cNvSpPr txBox="1">
+                    <a:spLocks noRot="1" noChangeAspect="1" noMove="1" noResize="1" noEditPoints="1" noAdjustHandles="1" noChangeArrowheads="1" noChangeShapeType="1" noTextEdit="1"/>
+                  </p:cNvSpPr>
+                  <p:nvPr/>
+                </p:nvSpPr>
+                <p:spPr>
+                  <a:xfrm>
+                    <a:off x="1754091" y="5988762"/>
+                    <a:ext cx="3331826" cy="369332"/>
+                  </a:xfrm>
+                  <a:prstGeom prst="rect">
+                    <a:avLst/>
+                  </a:prstGeom>
+                  <a:blipFill>
+                    <a:blip r:embed="rId4"/>
+                    <a:stretch>
+                      <a:fillRect l="-1463" t="-10000" b="-26667"/>
+                    </a:stretch>
+                  </a:blipFill>
+                </p:spPr>
+                <p:txBody>
+                  <a:bodyPr/>
+                  <a:lstStyle/>
+                  <a:p>
+                    <a:r>
+                      <a:rPr lang="en-US">
+                        <a:noFill/>
+                      </a:rPr>
+                      <a:t> </a:t>
+                    </a:r>
+                  </a:p>
+                </p:txBody>
+              </p:sp>
+            </mc:Fallback>
+          </mc:AlternateContent>
+        </p:grpSp>
+        <p:sp>
+          <p:nvSpPr>
+            <p:cNvPr id="14" name="TextBox 13"/>
+            <p:cNvSpPr txBox="1"/>
+            <p:nvPr/>
+          </p:nvSpPr>
+          <p:spPr>
+            <a:xfrm>
+              <a:off x="7603138" y="4991156"/>
+              <a:ext cx="620905" cy="369332"/>
+            </a:xfrm>
+            <a:prstGeom prst="rect">
+              <a:avLst/>
+            </a:prstGeom>
+            <a:noFill/>
+          </p:spPr>
+          <p:txBody>
+            <a:bodyPr wrap="square" rtlCol="0">
+              <a:spAutoFit/>
+            </a:bodyPr>
+            <a:lstStyle/>
+            <a:p>
+              <a:r>
+                <a:rPr lang="en-US" dirty="0"/>
+                <a:t>162</a:t>
+              </a:r>
+            </a:p>
+          </p:txBody>
+        </p:sp>
+        <p:sp>
+          <p:nvSpPr>
+            <p:cNvPr id="15" name="TextBox 14"/>
+            <p:cNvSpPr txBox="1"/>
+            <p:nvPr/>
+          </p:nvSpPr>
+          <p:spPr>
+            <a:xfrm>
+              <a:off x="8294686" y="4743857"/>
+              <a:ext cx="620905" cy="369332"/>
+            </a:xfrm>
+            <a:prstGeom prst="rect">
+              <a:avLst/>
+            </a:prstGeom>
+            <a:noFill/>
+          </p:spPr>
+          <p:txBody>
+            <a:bodyPr wrap="square" rtlCol="0">
+              <a:spAutoFit/>
+            </a:bodyPr>
+            <a:lstStyle/>
+            <a:p>
+              <a:r>
+                <a:rPr lang="en-US" dirty="0">
+                  <a:solidFill>
+                    <a:schemeClr val="bg1">
+                      <a:lumMod val="95000"/>
+                      <a:lumOff val="5000"/>
+                    </a:schemeClr>
+                  </a:solidFill>
+                </a:rPr>
+                <a:t>235</a:t>
+              </a:r>
+            </a:p>
+          </p:txBody>
+        </p:sp>
+        <p:sp>
+          <p:nvSpPr>
+            <p:cNvPr id="16" name="TextBox 15"/>
+            <p:cNvSpPr txBox="1"/>
+            <p:nvPr/>
+          </p:nvSpPr>
+          <p:spPr>
+            <a:xfrm>
+              <a:off x="8978907" y="5208473"/>
+              <a:ext cx="620905" cy="369332"/>
+            </a:xfrm>
+            <a:prstGeom prst="rect">
+              <a:avLst/>
+            </a:prstGeom>
+            <a:noFill/>
+          </p:spPr>
+          <p:txBody>
+            <a:bodyPr wrap="square" rtlCol="0">
+              <a:spAutoFit/>
+            </a:bodyPr>
+            <a:lstStyle/>
+            <a:p>
+              <a:r>
+                <a:rPr lang="en-US" dirty="0">
+                  <a:solidFill>
+                    <a:schemeClr val="bg1">
+                      <a:lumMod val="95000"/>
+                      <a:lumOff val="5000"/>
+                    </a:schemeClr>
+                  </a:solidFill>
+                </a:rPr>
+                <a:t>111</a:t>
+              </a:r>
+            </a:p>
+          </p:txBody>
+        </p:sp>
+        <p:sp>
+          <p:nvSpPr>
+            <p:cNvPr id="17" name="TextBox 16"/>
+            <p:cNvSpPr txBox="1"/>
+            <p:nvPr/>
+          </p:nvSpPr>
+          <p:spPr>
+            <a:xfrm>
+              <a:off x="9733771" y="5516798"/>
+              <a:ext cx="620905" cy="369332"/>
+            </a:xfrm>
+            <a:prstGeom prst="rect">
+              <a:avLst/>
+            </a:prstGeom>
+            <a:noFill/>
+          </p:spPr>
+          <p:txBody>
+            <a:bodyPr wrap="square" rtlCol="0">
+              <a:spAutoFit/>
+            </a:bodyPr>
+            <a:lstStyle/>
+            <a:p>
+              <a:r>
+                <a:rPr lang="en-US" dirty="0">
+                  <a:solidFill>
+                    <a:schemeClr val="bg1">
+                      <a:lumMod val="95000"/>
+                      <a:lumOff val="5000"/>
+                    </a:schemeClr>
+                  </a:solidFill>
+                </a:rPr>
+                <a:t>72</a:t>
+              </a:r>
+            </a:p>
+          </p:txBody>
+        </p:sp>
+        <p:sp>
+          <p:nvSpPr>
+            <p:cNvPr id="18" name="TextBox 17"/>
+            <p:cNvSpPr txBox="1"/>
+            <p:nvPr/>
+          </p:nvSpPr>
+          <p:spPr>
+            <a:xfrm>
+              <a:off x="10459221" y="5406861"/>
+              <a:ext cx="620905" cy="369332"/>
+            </a:xfrm>
+            <a:prstGeom prst="rect">
+              <a:avLst/>
+            </a:prstGeom>
+            <a:noFill/>
+          </p:spPr>
+          <p:txBody>
+            <a:bodyPr wrap="square" rtlCol="0">
+              <a:spAutoFit/>
+            </a:bodyPr>
+            <a:lstStyle/>
+            <a:p>
+              <a:r>
+                <a:rPr lang="en-US" dirty="0"/>
+                <a:t>92</a:t>
+              </a:r>
+            </a:p>
+          </p:txBody>
+        </p:sp>
+        <p:sp>
+          <p:nvSpPr>
+            <p:cNvPr id="19" name="TextBox 18"/>
+            <p:cNvSpPr txBox="1"/>
+            <p:nvPr/>
+          </p:nvSpPr>
+          <p:spPr>
+            <a:xfrm>
+              <a:off x="11135716" y="5807461"/>
+              <a:ext cx="620905" cy="369332"/>
+            </a:xfrm>
+            <a:prstGeom prst="rect">
+              <a:avLst/>
+            </a:prstGeom>
+            <a:noFill/>
+          </p:spPr>
+          <p:txBody>
+            <a:bodyPr wrap="square" rtlCol="0">
+              <a:spAutoFit/>
+            </a:bodyPr>
+            <a:lstStyle/>
+            <a:p>
+              <a:r>
+                <a:rPr lang="en-US" dirty="0">
+                  <a:solidFill>
+                    <a:schemeClr val="bg1">
+                      <a:lumMod val="95000"/>
+                      <a:lumOff val="5000"/>
+                    </a:schemeClr>
+                  </a:solidFill>
+                </a:rPr>
+                <a:t>25</a:t>
+              </a:r>
+            </a:p>
+          </p:txBody>
+        </p:sp>
+      </p:grpSp>
+      <p:sp>
+        <p:nvSpPr>
+          <p:cNvPr id="2" name="Title 1"/>
+          <p:cNvSpPr>
+            <a:spLocks noGrp="1"/>
+          </p:cNvSpPr>
+          <p:nvPr>
+            <p:ph type="title"/>
+          </p:nvPr>
+        </p:nvSpPr>
+        <p:spPr>
+          <a:xfrm>
+            <a:off x="7278688" y="1013421"/>
+            <a:ext cx="3932237" cy="739074"/>
+          </a:xfrm>
+        </p:spPr>
+        <p:txBody>
+          <a:bodyPr>
+            <a:normAutofit fontScale="90000"/>
+          </a:bodyPr>
+          <a:lstStyle/>
+          <a:p>
+            <a:r>
+              <a:rPr lang="en-US" dirty="0"/>
+              <a:t>Levels of Biological Organization in the </a:t>
+            </a:r>
+            <a:r>
+              <a:rPr lang="en-US" dirty="0" err="1"/>
+              <a:t>AOPwiki</a:t>
+            </a:r>
+            <a:r>
+              <a:rPr lang="en-US" dirty="0"/>
+              <a:t> network</a:t>
+            </a:r>
+          </a:p>
+        </p:txBody>
+      </p:sp>
+      <p:sp>
+        <p:nvSpPr>
+          <p:cNvPr id="4" name="Text Placeholder 3"/>
+          <p:cNvSpPr>
+            <a:spLocks noGrp="1"/>
+          </p:cNvSpPr>
+          <p:nvPr>
+            <p:ph type="body" sz="half" idx="2"/>
+          </p:nvPr>
+        </p:nvSpPr>
+        <p:spPr>
+          <a:xfrm>
+            <a:off x="7323242" y="1766217"/>
+            <a:ext cx="3932237" cy="3811588"/>
+          </a:xfrm>
+        </p:spPr>
+        <p:txBody>
+          <a:bodyPr/>
+          <a:lstStyle/>
+          <a:p>
+            <a:r>
+              <a:rPr lang="en-US" dirty="0"/>
+              <a:t>Colors represent levels of biological organization associated to Key Events in the </a:t>
+            </a:r>
+            <a:r>
+              <a:rPr lang="en-US" dirty="0" err="1"/>
+              <a:t>AOPwiki</a:t>
+            </a:r>
+            <a:r>
+              <a:rPr lang="en-US" dirty="0"/>
+              <a:t>. A total of 750 unique key events are in the wiki, 53 Key events in the </a:t>
+            </a:r>
+            <a:r>
+              <a:rPr lang="en-US" dirty="0" err="1"/>
+              <a:t>AOPwiki</a:t>
+            </a:r>
+            <a:r>
+              <a:rPr lang="en-US" dirty="0"/>
+              <a:t> had unspecified levels of biological organization</a:t>
+            </a:r>
+          </a:p>
+        </p:txBody>
+      </p:sp>
+      <p:pic>
+        <p:nvPicPr>
+          <p:cNvPr id="24" name="Picture 23" descr="Screen Clipping"/>
+          <p:cNvPicPr>
+            <a:picLocks noChangeAspect="1"/>
+          </p:cNvPicPr>
+          <p:nvPr/>
+        </p:nvPicPr>
+        <p:blipFill>
+          <a:blip r:embed="rId5">
+            <a:extLst>
+              <a:ext uri="{28A0092B-C50C-407E-A947-70E740481C1C}">
+                <a14:useLocalDpi xmlns:a14="http://schemas.microsoft.com/office/drawing/2010/main" val="0"/>
+              </a:ext>
+            </a:extLst>
+          </a:blip>
+          <a:stretch>
+            <a:fillRect/>
+          </a:stretch>
+        </p:blipFill>
+        <p:spPr>
+          <a:xfrm>
+            <a:off x="5559881" y="4392970"/>
+            <a:ext cx="1644308" cy="2005558"/>
+          </a:xfrm>
+          <a:prstGeom prst="rect">
+            <a:avLst/>
+          </a:prstGeom>
         </p:spPr>
       </p:pic>
     </p:spTree>
     <p:extLst>
       <p:ext uri="{BB962C8B-B14F-4D97-AF65-F5344CB8AC3E}">
-        <p14:creationId xmlns:p14="http://schemas.microsoft.com/office/powerpoint/2010/main" val="1706549562"/>
+        <p14:creationId xmlns:p14="http://schemas.microsoft.com/office/powerpoint/2010/main" val="1569041523"/>
       </p:ext>
     </p:extLst>
   </p:cSld>

</xml_diff>

<commit_message>
Added data and import functions to R
</commit_message>
<xml_diff>
--- a/AOPwiki_analysis_ccs.pptx
+++ b/AOPwiki_analysis_ccs.pptx
@@ -7,9 +7,13 @@
   <p:sldIdLst>
     <p:sldId id="256" r:id="rId2"/>
     <p:sldId id="257" r:id="rId3"/>
-    <p:sldId id="260" r:id="rId4"/>
-    <p:sldId id="261" r:id="rId5"/>
-    <p:sldId id="262" r:id="rId6"/>
+    <p:sldId id="266" r:id="rId4"/>
+    <p:sldId id="260" r:id="rId5"/>
+    <p:sldId id="264" r:id="rId6"/>
+    <p:sldId id="261" r:id="rId7"/>
+    <p:sldId id="265" r:id="rId8"/>
+    <p:sldId id="262" r:id="rId9"/>
+    <p:sldId id="263" r:id="rId10"/>
   </p:sldIdLst>
   <p:sldSz cx="12192000" cy="6858000"/>
   <p:notesSz cx="6858000" cy="9144000"/>
@@ -115,9 +119,13 @@
           <p14:sldIdLst>
             <p14:sldId id="256"/>
             <p14:sldId id="257"/>
+            <p14:sldId id="266"/>
             <p14:sldId id="260"/>
+            <p14:sldId id="264"/>
             <p14:sldId id="261"/>
+            <p14:sldId id="265"/>
             <p14:sldId id="262"/>
+            <p14:sldId id="263"/>
           </p14:sldIdLst>
         </p14:section>
       </p14:sectionLst>
@@ -260,7 +268,7 @@
           <a:p>
             <a:fld id="{C71581C8-DC5B-4BAA-A235-D61CE073C796}" type="datetimeFigureOut">
               <a:rPr lang="en-US" smtClean="0"/>
-              <a:t>5/12/2017</a:t>
+              <a:t>5/18/2017</a:t>
             </a:fld>
             <a:endParaRPr lang="en-US"/>
           </a:p>
@@ -435,7 +443,7 @@
           <a:p>
             <a:fld id="{C71581C8-DC5B-4BAA-A235-D61CE073C796}" type="datetimeFigureOut">
               <a:rPr lang="en-US" smtClean="0"/>
-              <a:t>5/12/2017</a:t>
+              <a:t>5/18/2017</a:t>
             </a:fld>
             <a:endParaRPr lang="en-US"/>
           </a:p>
@@ -615,7 +623,7 @@
           <a:p>
             <a:fld id="{C71581C8-DC5B-4BAA-A235-D61CE073C796}" type="datetimeFigureOut">
               <a:rPr lang="en-US" smtClean="0"/>
-              <a:t>5/12/2017</a:t>
+              <a:t>5/18/2017</a:t>
             </a:fld>
             <a:endParaRPr lang="en-US"/>
           </a:p>
@@ -790,7 +798,7 @@
           <a:p>
             <a:fld id="{C71581C8-DC5B-4BAA-A235-D61CE073C796}" type="datetimeFigureOut">
               <a:rPr lang="en-US" smtClean="0"/>
-              <a:t>5/12/2017</a:t>
+              <a:t>5/18/2017</a:t>
             </a:fld>
             <a:endParaRPr lang="en-US"/>
           </a:p>
@@ -1036,7 +1044,7 @@
           <a:p>
             <a:fld id="{C71581C8-DC5B-4BAA-A235-D61CE073C796}" type="datetimeFigureOut">
               <a:rPr lang="en-US" smtClean="0"/>
-              <a:t>5/12/2017</a:t>
+              <a:t>5/18/2017</a:t>
             </a:fld>
             <a:endParaRPr lang="en-US"/>
           </a:p>
@@ -1273,7 +1281,7 @@
           <a:p>
             <a:fld id="{C71581C8-DC5B-4BAA-A235-D61CE073C796}" type="datetimeFigureOut">
               <a:rPr lang="en-US" smtClean="0"/>
-              <a:t>5/12/2017</a:t>
+              <a:t>5/18/2017</a:t>
             </a:fld>
             <a:endParaRPr lang="en-US"/>
           </a:p>
@@ -1640,7 +1648,7 @@
           <a:p>
             <a:fld id="{C71581C8-DC5B-4BAA-A235-D61CE073C796}" type="datetimeFigureOut">
               <a:rPr lang="en-US" smtClean="0"/>
-              <a:t>5/12/2017</a:t>
+              <a:t>5/18/2017</a:t>
             </a:fld>
             <a:endParaRPr lang="en-US"/>
           </a:p>
@@ -1758,7 +1766,7 @@
           <a:p>
             <a:fld id="{C71581C8-DC5B-4BAA-A235-D61CE073C796}" type="datetimeFigureOut">
               <a:rPr lang="en-US" smtClean="0"/>
-              <a:t>5/12/2017</a:t>
+              <a:t>5/18/2017</a:t>
             </a:fld>
             <a:endParaRPr lang="en-US"/>
           </a:p>
@@ -1853,7 +1861,7 @@
           <a:p>
             <a:fld id="{C71581C8-DC5B-4BAA-A235-D61CE073C796}" type="datetimeFigureOut">
               <a:rPr lang="en-US" smtClean="0"/>
-              <a:t>5/12/2017</a:t>
+              <a:t>5/18/2017</a:t>
             </a:fld>
             <a:endParaRPr lang="en-US"/>
           </a:p>
@@ -2130,7 +2138,7 @@
           <a:p>
             <a:fld id="{C71581C8-DC5B-4BAA-A235-D61CE073C796}" type="datetimeFigureOut">
               <a:rPr lang="en-US" smtClean="0"/>
-              <a:t>5/12/2017</a:t>
+              <a:t>5/18/2017</a:t>
             </a:fld>
             <a:endParaRPr lang="en-US"/>
           </a:p>
@@ -2387,7 +2395,7 @@
           <a:p>
             <a:fld id="{C71581C8-DC5B-4BAA-A235-D61CE073C796}" type="datetimeFigureOut">
               <a:rPr lang="en-US" smtClean="0"/>
-              <a:t>5/12/2017</a:t>
+              <a:t>5/18/2017</a:t>
             </a:fld>
             <a:endParaRPr lang="en-US"/>
           </a:p>
@@ -2600,7 +2608,7 @@
           <a:p>
             <a:fld id="{C71581C8-DC5B-4BAA-A235-D61CE073C796}" type="datetimeFigureOut">
               <a:rPr lang="en-US" smtClean="0"/>
-              <a:t>5/12/2017</a:t>
+              <a:t>5/18/2017</a:t>
             </a:fld>
             <a:endParaRPr lang="en-US"/>
           </a:p>
@@ -3036,33 +3044,6 @@
           </a:p>
         </p:txBody>
       </p:sp>
-      <p:sp>
-        <p:nvSpPr>
-          <p:cNvPr id="3" name="Subtitle 2"/>
-          <p:cNvSpPr>
-            <a:spLocks noGrp="1"/>
-          </p:cNvSpPr>
-          <p:nvPr>
-            <p:ph type="subTitle" idx="1"/>
-          </p:nvPr>
-        </p:nvSpPr>
-        <p:spPr/>
-        <p:txBody>
-          <a:bodyPr/>
-          <a:lstStyle/>
-          <a:p>
-            <a:r>
-              <a:rPr lang="en-US" dirty="0"/>
-              <a:t>Nate Pollesch, Jason O’Brien, and Dan </a:t>
-            </a:r>
-            <a:r>
-              <a:rPr lang="en-US" dirty="0" err="1"/>
-              <a:t>Villenueve</a:t>
-            </a:r>
-            <a:endParaRPr lang="en-US" dirty="0"/>
-          </a:p>
-        </p:txBody>
-      </p:sp>
     </p:spTree>
     <p:extLst>
       <p:ext uri="{BB962C8B-B14F-4D97-AF65-F5344CB8AC3E}">
@@ -3193,8 +3174,8 @@
         </p:blipFill>
         <p:spPr>
           <a:xfrm>
-            <a:off x="5103626" y="0"/>
-            <a:ext cx="7088374" cy="6858000"/>
+            <a:off x="5181600" y="61502"/>
+            <a:ext cx="6972300" cy="6745698"/>
           </a:xfrm>
           <a:prstGeom prst="rect">
             <a:avLst/>
@@ -3243,19 +3224,19 @@
         </p:nvSpPr>
         <p:spPr>
           <a:xfrm>
-            <a:off x="7425414" y="622630"/>
-            <a:ext cx="3932237" cy="1600200"/>
+            <a:off x="841626" y="184674"/>
+            <a:ext cx="3932237" cy="1447800"/>
           </a:xfrm>
         </p:spPr>
         <p:txBody>
           <a:bodyPr vert="horz" lIns="91440" tIns="45720" rIns="91440" bIns="45720" rtlCol="0" anchor="b">
-            <a:normAutofit fontScale="90000"/>
+            <a:normAutofit/>
           </a:bodyPr>
           <a:lstStyle/>
           <a:p>
             <a:r>
               <a:rPr lang="en-US" sz="4000" dirty="0"/>
-              <a:t>Components of the </a:t>
+              <a:t>The Complete </a:t>
             </a:r>
             <a:r>
               <a:rPr lang="en-US" sz="4000" dirty="0" err="1"/>
@@ -3263,96 +3244,18 @@
             </a:r>
             <a:r>
               <a:rPr lang="en-US" sz="4000" dirty="0"/>
-              <a:t> network</a:t>
-            </a:r>
-          </a:p>
-        </p:txBody>
-      </p:sp>
-      <p:sp>
-        <p:nvSpPr>
-          <p:cNvPr id="16" name="Text Placeholder 15"/>
-          <p:cNvSpPr>
-            <a:spLocks noGrp="1"/>
-          </p:cNvSpPr>
-          <p:nvPr>
-            <p:ph type="body" sz="half" idx="2"/>
-          </p:nvPr>
-        </p:nvSpPr>
-        <p:spPr>
-          <a:xfrm>
-            <a:off x="7425414" y="2222830"/>
-            <a:ext cx="3932237" cy="3811588"/>
-          </a:xfrm>
-        </p:spPr>
-        <p:txBody>
-          <a:bodyPr/>
-          <a:lstStyle/>
-          <a:p>
-            <a:r>
-              <a:rPr lang="en-US" dirty="0"/>
-              <a:t>A network diagram of the Adverse Outcome Pathway Wiki database of AOPs. </a:t>
-            </a:r>
-          </a:p>
-          <a:p>
-            <a:r>
-              <a:rPr lang="en-US" dirty="0"/>
-              <a:t>In this figure, colors highlight distinct weakly connected components where an undirected path can be found between any nodes within the component (check </a:t>
-            </a:r>
-            <a:r>
-              <a:rPr lang="en-US" dirty="0" err="1"/>
-              <a:t>def’n</a:t>
-            </a:r>
-            <a:r>
-              <a:rPr lang="en-US" dirty="0"/>
-              <a:t>).</a:t>
-            </a:r>
-          </a:p>
-          <a:p>
-            <a:r>
-              <a:rPr lang="en-US" dirty="0"/>
-              <a:t>Within the AOP context, weakly connected components highlight AOP networks where at least one key event relationships.</a:t>
-            </a:r>
-          </a:p>
-          <a:p>
-            <a:r>
-              <a:rPr lang="en-US" dirty="0"/>
-              <a:t>There are 34 weakly connected components in the </a:t>
-            </a:r>
-            <a:r>
-              <a:rPr lang="en-US" dirty="0" err="1"/>
-              <a:t>AOPwiki</a:t>
-            </a:r>
-            <a:r>
-              <a:rPr lang="en-US" dirty="0"/>
-              <a:t> network.  The largest has 494 key events in it, the smallest has 2.</a:t>
-            </a:r>
-          </a:p>
-          <a:p>
-            <a:endParaRPr lang="en-US" dirty="0"/>
-          </a:p>
-          <a:p>
-            <a:endParaRPr lang="en-US" dirty="0"/>
-          </a:p>
-          <a:p>
-            <a:endParaRPr lang="en-US" dirty="0"/>
-          </a:p>
-          <a:p>
-            <a:endParaRPr lang="en-US" dirty="0"/>
-          </a:p>
-          <a:p>
-            <a:endParaRPr lang="en-US" dirty="0"/>
+              <a:t> Network</a:t>
+            </a:r>
           </a:p>
         </p:txBody>
       </p:sp>
       <p:pic>
         <p:nvPicPr>
-          <p:cNvPr id="5" name="Content Placeholder 4" descr="Screen Clipping"/>
+          <p:cNvPr id="17" name="Content Placeholder 3" descr="Screen Clipping"/>
           <p:cNvPicPr>
-            <a:picLocks noGrp="1" noChangeAspect="1"/>
+            <a:picLocks noChangeAspect="1"/>
           </p:cNvPicPr>
-          <p:nvPr>
-            <p:ph idx="1"/>
-          </p:nvPr>
+          <p:nvPr/>
         </p:nvPicPr>
         <p:blipFill>
           <a:blip r:embed="rId2">
@@ -3368,15 +3271,147 @@
         </p:blipFill>
         <p:spPr>
           <a:xfrm>
-            <a:off x="190500" y="0"/>
-            <a:ext cx="6832600" cy="6858449"/>
-          </a:xfrm>
+            <a:off x="5181600" y="61502"/>
+            <a:ext cx="6972300" cy="6745698"/>
+          </a:xfrm>
+          <a:prstGeom prst="rect">
+            <a:avLst/>
+          </a:prstGeom>
         </p:spPr>
       </p:pic>
+      <p:pic>
+        <p:nvPicPr>
+          <p:cNvPr id="4" name="Picture 3" descr="Screen Clipping"/>
+          <p:cNvPicPr>
+            <a:picLocks noChangeAspect="1"/>
+          </p:cNvPicPr>
+          <p:nvPr/>
+        </p:nvPicPr>
+        <p:blipFill>
+          <a:blip r:embed="rId3">
+            <a:extLst>
+              <a:ext uri="{28A0092B-C50C-407E-A947-70E740481C1C}">
+                <a14:useLocalDpi xmlns:a14="http://schemas.microsoft.com/office/drawing/2010/main" val="0"/>
+              </a:ext>
+            </a:extLst>
+          </a:blip>
+          <a:stretch>
+            <a:fillRect/>
+          </a:stretch>
+        </p:blipFill>
+        <p:spPr>
+          <a:xfrm>
+            <a:off x="5168899" y="218788"/>
+            <a:ext cx="6781801" cy="6518259"/>
+          </a:xfrm>
+          <a:prstGeom prst="rect">
+            <a:avLst/>
+          </a:prstGeom>
+        </p:spPr>
+      </p:pic>
+      <p:pic>
+        <p:nvPicPr>
+          <p:cNvPr id="5" name="Picture 4" descr="Screen Clipping"/>
+          <p:cNvPicPr>
+            <a:picLocks noChangeAspect="1"/>
+          </p:cNvPicPr>
+          <p:nvPr/>
+        </p:nvPicPr>
+        <p:blipFill>
+          <a:blip r:embed="rId4">
+            <a:extLst>
+              <a:ext uri="{28A0092B-C50C-407E-A947-70E740481C1C}">
+                <a14:useLocalDpi xmlns:a14="http://schemas.microsoft.com/office/drawing/2010/main" val="0"/>
+              </a:ext>
+            </a:extLst>
+          </a:blip>
+          <a:stretch>
+            <a:fillRect/>
+          </a:stretch>
+        </p:blipFill>
+        <p:spPr>
+          <a:xfrm>
+            <a:off x="638426" y="3216335"/>
+            <a:ext cx="3960311" cy="3641665"/>
+          </a:xfrm>
+          <a:prstGeom prst="rect">
+            <a:avLst/>
+          </a:prstGeom>
+        </p:spPr>
+      </p:pic>
+      <p:sp>
+        <p:nvSpPr>
+          <p:cNvPr id="16" name="Text Placeholder 15"/>
+          <p:cNvSpPr>
+            <a:spLocks noGrp="1"/>
+          </p:cNvSpPr>
+          <p:nvPr>
+            <p:ph type="body" sz="half" idx="2"/>
+          </p:nvPr>
+        </p:nvSpPr>
+        <p:spPr>
+          <a:xfrm>
+            <a:off x="841626" y="1668167"/>
+            <a:ext cx="3932237" cy="3619500"/>
+          </a:xfrm>
+        </p:spPr>
+        <p:txBody>
+          <a:bodyPr>
+            <a:normAutofit/>
+          </a:bodyPr>
+          <a:lstStyle/>
+          <a:p>
+            <a:r>
+              <a:rPr lang="en-US" dirty="0"/>
+              <a:t>The AOP wiki has:</a:t>
+            </a:r>
+          </a:p>
+          <a:p>
+            <a:pPr marL="285750" indent="-285750">
+              <a:buFont typeface="Arial" panose="020B0604020202020204" pitchFamily="34" charset="0"/>
+              <a:buChar char="•"/>
+            </a:pPr>
+            <a:r>
+              <a:rPr lang="en-US" dirty="0"/>
+              <a:t>131 different AOPs </a:t>
+            </a:r>
+          </a:p>
+          <a:p>
+            <a:pPr marL="285750" indent="-285750">
+              <a:buFont typeface="Arial" panose="020B0604020202020204" pitchFamily="34" charset="0"/>
+              <a:buChar char="•"/>
+            </a:pPr>
+            <a:r>
+              <a:rPr lang="en-US" dirty="0"/>
+              <a:t>1058 key event relationships</a:t>
+            </a:r>
+          </a:p>
+          <a:p>
+            <a:pPr marL="285750" indent="-285750">
+              <a:buFont typeface="Arial" panose="020B0604020202020204" pitchFamily="34" charset="0"/>
+              <a:buChar char="•"/>
+            </a:pPr>
+            <a:r>
+              <a:rPr lang="en-US" dirty="0"/>
+              <a:t>750 unique key events</a:t>
+            </a:r>
+          </a:p>
+          <a:p>
+            <a:pPr marL="285750" indent="-285750">
+              <a:buFont typeface="Arial" panose="020B0604020202020204" pitchFamily="34" charset="0"/>
+              <a:buChar char="•"/>
+            </a:pPr>
+            <a:r>
+              <a:rPr lang="en-US" dirty="0"/>
+              <a:t>Mean number of KEs per AOP is 4.8</a:t>
+            </a:r>
+          </a:p>
+        </p:txBody>
+      </p:sp>
     </p:spTree>
     <p:extLst>
       <p:ext uri="{BB962C8B-B14F-4D97-AF65-F5344CB8AC3E}">
-        <p14:creationId xmlns:p14="http://schemas.microsoft.com/office/powerpoint/2010/main" val="1492238267"/>
+        <p14:creationId xmlns:p14="http://schemas.microsoft.com/office/powerpoint/2010/main" val="618629036"/>
       </p:ext>
     </p:extLst>
   </p:cSld>
@@ -3413,7 +3448,12 @@
             <p:ph type="title"/>
           </p:nvPr>
         </p:nvSpPr>
-        <p:spPr/>
+        <p:spPr>
+          <a:xfrm>
+            <a:off x="7425414" y="622630"/>
+            <a:ext cx="3932237" cy="1600200"/>
+          </a:xfrm>
+        </p:spPr>
         <p:txBody>
           <a:bodyPr vert="horz" lIns="91440" tIns="45720" rIns="91440" bIns="45720" rtlCol="0" anchor="b">
             <a:normAutofit fontScale="90000"/>
@@ -3445,7 +3485,12 @@
             <p:ph type="body" sz="half" idx="2"/>
           </p:nvPr>
         </p:nvSpPr>
-        <p:spPr/>
+        <p:spPr>
+          <a:xfrm>
+            <a:off x="7425414" y="2222830"/>
+            <a:ext cx="3932237" cy="3811588"/>
+          </a:xfrm>
+        </p:spPr>
         <p:txBody>
           <a:bodyPr/>
           <a:lstStyle/>
@@ -3458,28 +3503,25 @@
           <a:p>
             <a:r>
               <a:rPr lang="en-US" dirty="0"/>
-              <a:t>In this figure, colors highlight distinct strongly connected components.  Nodes within strongly connected components have a directed path to each other node in the network.</a:t>
-            </a:r>
-          </a:p>
-          <a:p>
+              <a:t>In this figure, colors highlight distinct weakly connected components where an undirected path can be found between any nodes within the component (check </a:t>
+            </a:r>
+            <a:r>
+              <a:rPr lang="en-US" dirty="0" err="1"/>
+              <a:t>def’n</a:t>
+            </a:r>
             <a:r>
               <a:rPr lang="en-US" dirty="0"/>
-              <a:t>Within the AOP context, a strongly connected component highlights cycles or feedback loops between Key Events.</a:t>
+              <a:t>).</a:t>
             </a:r>
           </a:p>
           <a:p>
             <a:r>
               <a:rPr lang="en-US" dirty="0"/>
-              <a:t>In the </a:t>
-            </a:r>
-            <a:r>
-              <a:rPr lang="en-US" dirty="0" err="1"/>
-              <a:t>AOPwiki</a:t>
-            </a:r>
-            <a:r>
-              <a:rPr lang="en-US" dirty="0"/>
-              <a:t> network there are 7 distinct cycles that emerge.</a:t>
-            </a:r>
+              <a:t>Within the AOP context, weakly connected components highlight AOP networks where at least one key event relationships.</a:t>
+            </a:r>
+          </a:p>
+          <a:p>
+            <a:endParaRPr lang="en-US" dirty="0"/>
           </a:p>
           <a:p>
             <a:endParaRPr lang="en-US" dirty="0"/>
@@ -3497,11 +3539,13 @@
       </p:sp>
       <p:pic>
         <p:nvPicPr>
-          <p:cNvPr id="17" name="Content Placeholder 3" descr="Screen Clipping"/>
+          <p:cNvPr id="5" name="Content Placeholder 4" descr="Screen Clipping"/>
           <p:cNvPicPr>
-            <a:picLocks noChangeAspect="1"/>
+            <a:picLocks noGrp="1" noChangeAspect="1"/>
           </p:cNvPicPr>
-          <p:nvPr/>
+          <p:nvPr>
+            <p:ph idx="1"/>
+          </p:nvPr>
         </p:nvPicPr>
         <p:blipFill>
           <a:blip r:embed="rId2">
@@ -3517,46 +3561,15 @@
         </p:blipFill>
         <p:spPr>
           <a:xfrm>
-            <a:off x="5429324" y="247593"/>
-            <a:ext cx="6598368" cy="6383919"/>
-          </a:xfrm>
-          <a:prstGeom prst="rect">
-            <a:avLst/>
-          </a:prstGeom>
-        </p:spPr>
-      </p:pic>
-      <p:pic>
-        <p:nvPicPr>
-          <p:cNvPr id="5" name="Content Placeholder 6" descr="Screen Clipping"/>
-          <p:cNvPicPr>
-            <a:picLocks noGrp="1" noChangeAspect="1"/>
-          </p:cNvPicPr>
-          <p:nvPr>
-            <p:ph idx="1"/>
-          </p:nvPr>
-        </p:nvPicPr>
-        <p:blipFill rotWithShape="1">
-          <a:blip r:embed="rId3">
-            <a:extLst>
-              <a:ext uri="{28A0092B-C50C-407E-A947-70E740481C1C}">
-                <a14:useLocalDpi xmlns:a14="http://schemas.microsoft.com/office/drawing/2010/main" val="0"/>
-              </a:ext>
-            </a:extLst>
-          </a:blip>
-          <a:srcRect b="2703"/>
-          <a:stretch/>
-        </p:blipFill>
-        <p:spPr>
-          <a:xfrm>
-            <a:off x="5143500" y="0"/>
-            <a:ext cx="7048500" cy="6858000"/>
+            <a:off x="190500" y="0"/>
+            <a:ext cx="6832600" cy="6858449"/>
           </a:xfrm>
         </p:spPr>
       </p:pic>
     </p:spTree>
     <p:extLst>
       <p:ext uri="{BB962C8B-B14F-4D97-AF65-F5344CB8AC3E}">
-        <p14:creationId xmlns:p14="http://schemas.microsoft.com/office/powerpoint/2010/main" val="1706549562"/>
+        <p14:creationId xmlns:p14="http://schemas.microsoft.com/office/powerpoint/2010/main" val="1492238267"/>
       </p:ext>
     </p:extLst>
   </p:cSld>
@@ -3583,9 +3596,96 @@
           <a:chExt cx="0" cy="0"/>
         </a:xfrm>
       </p:grpSpPr>
+      <p:sp>
+        <p:nvSpPr>
+          <p:cNvPr id="2" name="Title 1"/>
+          <p:cNvSpPr>
+            <a:spLocks noGrp="1"/>
+          </p:cNvSpPr>
+          <p:nvPr>
+            <p:ph type="title"/>
+          </p:nvPr>
+        </p:nvSpPr>
+        <p:spPr>
+          <a:xfrm>
+            <a:off x="7425414" y="622630"/>
+            <a:ext cx="3932237" cy="1600200"/>
+          </a:xfrm>
+        </p:spPr>
+        <p:txBody>
+          <a:bodyPr vert="horz" lIns="91440" tIns="45720" rIns="91440" bIns="45720" rtlCol="0" anchor="b">
+            <a:normAutofit fontScale="90000"/>
+          </a:bodyPr>
+          <a:lstStyle/>
+          <a:p>
+            <a:r>
+              <a:rPr lang="en-US" sz="4000" dirty="0"/>
+              <a:t>Components of the </a:t>
+            </a:r>
+            <a:r>
+              <a:rPr lang="en-US" sz="4000" dirty="0" err="1"/>
+              <a:t>AOPwiki</a:t>
+            </a:r>
+            <a:r>
+              <a:rPr lang="en-US" sz="4000" dirty="0"/>
+              <a:t> network</a:t>
+            </a:r>
+          </a:p>
+        </p:txBody>
+      </p:sp>
+      <p:sp>
+        <p:nvSpPr>
+          <p:cNvPr id="16" name="Text Placeholder 15"/>
+          <p:cNvSpPr>
+            <a:spLocks noGrp="1"/>
+          </p:cNvSpPr>
+          <p:nvPr>
+            <p:ph type="body" sz="half" idx="2"/>
+          </p:nvPr>
+        </p:nvSpPr>
+        <p:spPr>
+          <a:xfrm>
+            <a:off x="7425414" y="2222830"/>
+            <a:ext cx="3932237" cy="3811588"/>
+          </a:xfrm>
+        </p:spPr>
+        <p:txBody>
+          <a:bodyPr/>
+          <a:lstStyle/>
+          <a:p>
+            <a:r>
+              <a:rPr lang="en-US" dirty="0"/>
+              <a:t>In the </a:t>
+            </a:r>
+            <a:r>
+              <a:rPr lang="en-US" dirty="0" err="1"/>
+              <a:t>AOPwiki</a:t>
+            </a:r>
+            <a:r>
+              <a:rPr lang="en-US" dirty="0"/>
+              <a:t> network.  The largest weakly connected component has 494 key events in it, the smallest has 2.</a:t>
+            </a:r>
+          </a:p>
+          <a:p>
+            <a:endParaRPr lang="en-US" dirty="0"/>
+          </a:p>
+          <a:p>
+            <a:endParaRPr lang="en-US" dirty="0"/>
+          </a:p>
+          <a:p>
+            <a:endParaRPr lang="en-US" dirty="0"/>
+          </a:p>
+          <a:p>
+            <a:endParaRPr lang="en-US" dirty="0"/>
+          </a:p>
+          <a:p>
+            <a:endParaRPr lang="en-US" dirty="0"/>
+          </a:p>
+        </p:txBody>
+      </p:sp>
       <p:pic>
         <p:nvPicPr>
-          <p:cNvPr id="22" name="Content Placeholder 21" descr="Screen Clipping"/>
+          <p:cNvPr id="5" name="Content Placeholder 4" descr="Screen Clipping"/>
           <p:cNvPicPr>
             <a:picLocks noGrp="1" noChangeAspect="1"/>
           </p:cNvPicPr>
@@ -3607,474 +3707,21 @@
         </p:blipFill>
         <p:spPr>
           <a:xfrm>
-            <a:off x="4798" y="1"/>
-            <a:ext cx="7075140" cy="6858000"/>
+            <a:off x="190500" y="0"/>
+            <a:ext cx="6832600" cy="6858449"/>
           </a:xfrm>
         </p:spPr>
       </p:pic>
-      <p:grpSp>
-        <p:nvGrpSpPr>
-          <p:cNvPr id="20" name="Group 19"/>
-          <p:cNvGrpSpPr/>
-          <p:nvPr/>
-        </p:nvGrpSpPr>
-        <p:grpSpPr>
-          <a:xfrm>
-            <a:off x="7357180" y="3256822"/>
-            <a:ext cx="4685791" cy="3480522"/>
-            <a:chOff x="7070830" y="3144272"/>
-            <a:chExt cx="4685791" cy="3480522"/>
-          </a:xfrm>
-        </p:grpSpPr>
-        <p:grpSp>
-          <p:nvGrpSpPr>
-            <p:cNvPr id="13" name="Group 12"/>
-            <p:cNvGrpSpPr/>
-            <p:nvPr/>
-          </p:nvGrpSpPr>
-          <p:grpSpPr>
-            <a:xfrm>
-              <a:off x="7070830" y="3144272"/>
-              <a:ext cx="4660391" cy="3480522"/>
-              <a:chOff x="911330" y="2877572"/>
-              <a:chExt cx="4660391" cy="3480522"/>
-            </a:xfrm>
-          </p:grpSpPr>
-          <p:pic>
-            <p:nvPicPr>
-              <p:cNvPr id="10" name="Picture 9" descr="Screen Clipping"/>
-              <p:cNvPicPr>
-                <a:picLocks noChangeAspect="1"/>
-              </p:cNvPicPr>
-              <p:nvPr/>
-            </p:nvPicPr>
-            <p:blipFill>
-              <a:blip r:embed="rId3">
-                <a:extLst>
-                  <a:ext uri="{28A0092B-C50C-407E-A947-70E740481C1C}">
-                    <a14:useLocalDpi xmlns:a14="http://schemas.microsoft.com/office/drawing/2010/main" val="0"/>
-                  </a:ext>
-                </a:extLst>
-              </a:blip>
-              <a:stretch>
-                <a:fillRect/>
-              </a:stretch>
-            </p:blipFill>
-            <p:spPr>
-              <a:xfrm>
-                <a:off x="1268287" y="2877572"/>
-                <a:ext cx="4303434" cy="3111190"/>
-              </a:xfrm>
-              <a:prstGeom prst="rect">
-                <a:avLst/>
-              </a:prstGeom>
-            </p:spPr>
-          </p:pic>
-          <p:sp>
-            <p:nvSpPr>
-              <p:cNvPr id="11" name="TextBox 10"/>
-              <p:cNvSpPr txBox="1"/>
-              <p:nvPr/>
-            </p:nvSpPr>
-            <p:spPr>
-              <a:xfrm>
-                <a:off x="911330" y="3098800"/>
-                <a:ext cx="461665" cy="1917699"/>
-              </a:xfrm>
-              <a:prstGeom prst="rect">
-                <a:avLst/>
-              </a:prstGeom>
-              <a:noFill/>
-            </p:spPr>
-            <p:txBody>
-              <a:bodyPr vert="vert270" wrap="square" rtlCol="0">
-                <a:spAutoFit/>
-              </a:bodyPr>
-              <a:lstStyle/>
-              <a:p>
-                <a:r>
-                  <a:rPr lang="en-US" dirty="0"/>
-                  <a:t>KE Occurrence</a:t>
-                </a:r>
-              </a:p>
-            </p:txBody>
-          </p:sp>
-          <mc:AlternateContent xmlns:mc="http://schemas.openxmlformats.org/markup-compatibility/2006">
-            <mc:Choice xmlns:a14="http://schemas.microsoft.com/office/drawing/2010/main" Requires="a14">
-              <p:sp>
-                <p:nvSpPr>
-                  <p:cNvPr id="12" name="TextBox 11"/>
-                  <p:cNvSpPr txBox="1"/>
-                  <p:nvPr/>
-                </p:nvSpPr>
-                <p:spPr>
-                  <a:xfrm>
-                    <a:off x="1754091" y="5988762"/>
-                    <a:ext cx="3331826" cy="369332"/>
-                  </a:xfrm>
-                  <a:prstGeom prst="rect">
-                    <a:avLst/>
-                  </a:prstGeom>
-                  <a:noFill/>
-                </p:spPr>
-                <p:txBody>
-                  <a:bodyPr vert="horz" wrap="square" rtlCol="0">
-                    <a:spAutoFit/>
-                  </a:bodyPr>
-                  <a:lstStyle/>
-                  <a:p>
-                    <a:r>
-                      <a:rPr lang="en-US" dirty="0"/>
-                      <a:t>Increasing level of organization </a:t>
-                    </a:r>
-                    <a14:m>
-                      <m:oMath xmlns:m="http://schemas.openxmlformats.org/officeDocument/2006/math">
-                        <m:r>
-                          <a:rPr lang="en-US" b="0" i="1" smtClean="0">
-                            <a:latin typeface="Cambria Math" panose="02040503050406030204" pitchFamily="18" charset="0"/>
-                          </a:rPr>
-                          <m:t>→</m:t>
-                        </m:r>
-                      </m:oMath>
-                    </a14:m>
-                    <a:endParaRPr lang="en-US" dirty="0"/>
-                  </a:p>
-                </p:txBody>
-              </p:sp>
-            </mc:Choice>
-            <mc:Fallback>
-              <p:sp>
-                <p:nvSpPr>
-                  <p:cNvPr id="12" name="TextBox 11"/>
-                  <p:cNvSpPr txBox="1">
-                    <a:spLocks noRot="1" noChangeAspect="1" noMove="1" noResize="1" noEditPoints="1" noAdjustHandles="1" noChangeArrowheads="1" noChangeShapeType="1" noTextEdit="1"/>
-                  </p:cNvSpPr>
-                  <p:nvPr/>
-                </p:nvSpPr>
-                <p:spPr>
-                  <a:xfrm>
-                    <a:off x="1754091" y="5988762"/>
-                    <a:ext cx="3331826" cy="369332"/>
-                  </a:xfrm>
-                  <a:prstGeom prst="rect">
-                    <a:avLst/>
-                  </a:prstGeom>
-                  <a:blipFill>
-                    <a:blip r:embed="rId4"/>
-                    <a:stretch>
-                      <a:fillRect l="-1463" t="-10000" b="-26667"/>
-                    </a:stretch>
-                  </a:blipFill>
-                </p:spPr>
-                <p:txBody>
-                  <a:bodyPr/>
-                  <a:lstStyle/>
-                  <a:p>
-                    <a:r>
-                      <a:rPr lang="en-US">
-                        <a:noFill/>
-                      </a:rPr>
-                      <a:t> </a:t>
-                    </a:r>
-                  </a:p>
-                </p:txBody>
-              </p:sp>
-            </mc:Fallback>
-          </mc:AlternateContent>
-        </p:grpSp>
-        <p:sp>
-          <p:nvSpPr>
-            <p:cNvPr id="14" name="TextBox 13"/>
-            <p:cNvSpPr txBox="1"/>
-            <p:nvPr/>
-          </p:nvSpPr>
-          <p:spPr>
-            <a:xfrm>
-              <a:off x="7603138" y="4991156"/>
-              <a:ext cx="620905" cy="369332"/>
-            </a:xfrm>
-            <a:prstGeom prst="rect">
-              <a:avLst/>
-            </a:prstGeom>
-            <a:noFill/>
-          </p:spPr>
-          <p:txBody>
-            <a:bodyPr wrap="square" rtlCol="0">
-              <a:spAutoFit/>
-            </a:bodyPr>
-            <a:lstStyle/>
-            <a:p>
-              <a:r>
-                <a:rPr lang="en-US" dirty="0"/>
-                <a:t>162</a:t>
-              </a:r>
-            </a:p>
-          </p:txBody>
-        </p:sp>
-        <p:sp>
-          <p:nvSpPr>
-            <p:cNvPr id="15" name="TextBox 14"/>
-            <p:cNvSpPr txBox="1"/>
-            <p:nvPr/>
-          </p:nvSpPr>
-          <p:spPr>
-            <a:xfrm>
-              <a:off x="8294686" y="4743857"/>
-              <a:ext cx="620905" cy="369332"/>
-            </a:xfrm>
-            <a:prstGeom prst="rect">
-              <a:avLst/>
-            </a:prstGeom>
-            <a:noFill/>
-          </p:spPr>
-          <p:txBody>
-            <a:bodyPr wrap="square" rtlCol="0">
-              <a:spAutoFit/>
-            </a:bodyPr>
-            <a:lstStyle/>
-            <a:p>
-              <a:r>
-                <a:rPr lang="en-US" dirty="0">
-                  <a:solidFill>
-                    <a:schemeClr val="bg1">
-                      <a:lumMod val="95000"/>
-                      <a:lumOff val="5000"/>
-                    </a:schemeClr>
-                  </a:solidFill>
-                </a:rPr>
-                <a:t>235</a:t>
-              </a:r>
-            </a:p>
-          </p:txBody>
-        </p:sp>
-        <p:sp>
-          <p:nvSpPr>
-            <p:cNvPr id="16" name="TextBox 15"/>
-            <p:cNvSpPr txBox="1"/>
-            <p:nvPr/>
-          </p:nvSpPr>
-          <p:spPr>
-            <a:xfrm>
-              <a:off x="8978907" y="5208473"/>
-              <a:ext cx="620905" cy="369332"/>
-            </a:xfrm>
-            <a:prstGeom prst="rect">
-              <a:avLst/>
-            </a:prstGeom>
-            <a:noFill/>
-          </p:spPr>
-          <p:txBody>
-            <a:bodyPr wrap="square" rtlCol="0">
-              <a:spAutoFit/>
-            </a:bodyPr>
-            <a:lstStyle/>
-            <a:p>
-              <a:r>
-                <a:rPr lang="en-US" dirty="0">
-                  <a:solidFill>
-                    <a:schemeClr val="bg1">
-                      <a:lumMod val="95000"/>
-                      <a:lumOff val="5000"/>
-                    </a:schemeClr>
-                  </a:solidFill>
-                </a:rPr>
-                <a:t>111</a:t>
-              </a:r>
-            </a:p>
-          </p:txBody>
-        </p:sp>
-        <p:sp>
-          <p:nvSpPr>
-            <p:cNvPr id="17" name="TextBox 16"/>
-            <p:cNvSpPr txBox="1"/>
-            <p:nvPr/>
-          </p:nvSpPr>
-          <p:spPr>
-            <a:xfrm>
-              <a:off x="9733771" y="5516798"/>
-              <a:ext cx="620905" cy="369332"/>
-            </a:xfrm>
-            <a:prstGeom prst="rect">
-              <a:avLst/>
-            </a:prstGeom>
-            <a:noFill/>
-          </p:spPr>
-          <p:txBody>
-            <a:bodyPr wrap="square" rtlCol="0">
-              <a:spAutoFit/>
-            </a:bodyPr>
-            <a:lstStyle/>
-            <a:p>
-              <a:r>
-                <a:rPr lang="en-US" dirty="0">
-                  <a:solidFill>
-                    <a:schemeClr val="bg1">
-                      <a:lumMod val="95000"/>
-                      <a:lumOff val="5000"/>
-                    </a:schemeClr>
-                  </a:solidFill>
-                </a:rPr>
-                <a:t>72</a:t>
-              </a:r>
-            </a:p>
-          </p:txBody>
-        </p:sp>
-        <p:sp>
-          <p:nvSpPr>
-            <p:cNvPr id="18" name="TextBox 17"/>
-            <p:cNvSpPr txBox="1"/>
-            <p:nvPr/>
-          </p:nvSpPr>
-          <p:spPr>
-            <a:xfrm>
-              <a:off x="10459221" y="5406861"/>
-              <a:ext cx="620905" cy="369332"/>
-            </a:xfrm>
-            <a:prstGeom prst="rect">
-              <a:avLst/>
-            </a:prstGeom>
-            <a:noFill/>
-          </p:spPr>
-          <p:txBody>
-            <a:bodyPr wrap="square" rtlCol="0">
-              <a:spAutoFit/>
-            </a:bodyPr>
-            <a:lstStyle/>
-            <a:p>
-              <a:r>
-                <a:rPr lang="en-US" dirty="0"/>
-                <a:t>92</a:t>
-              </a:r>
-            </a:p>
-          </p:txBody>
-        </p:sp>
-        <p:sp>
-          <p:nvSpPr>
-            <p:cNvPr id="19" name="TextBox 18"/>
-            <p:cNvSpPr txBox="1"/>
-            <p:nvPr/>
-          </p:nvSpPr>
-          <p:spPr>
-            <a:xfrm>
-              <a:off x="11135716" y="5807461"/>
-              <a:ext cx="620905" cy="369332"/>
-            </a:xfrm>
-            <a:prstGeom prst="rect">
-              <a:avLst/>
-            </a:prstGeom>
-            <a:noFill/>
-          </p:spPr>
-          <p:txBody>
-            <a:bodyPr wrap="square" rtlCol="0">
-              <a:spAutoFit/>
-            </a:bodyPr>
-            <a:lstStyle/>
-            <a:p>
-              <a:r>
-                <a:rPr lang="en-US" dirty="0">
-                  <a:solidFill>
-                    <a:schemeClr val="bg1">
-                      <a:lumMod val="95000"/>
-                      <a:lumOff val="5000"/>
-                    </a:schemeClr>
-                  </a:solidFill>
-                </a:rPr>
-                <a:t>25</a:t>
-              </a:r>
-            </a:p>
-          </p:txBody>
-        </p:sp>
-      </p:grpSp>
-      <p:sp>
-        <p:nvSpPr>
-          <p:cNvPr id="2" name="Title 1"/>
-          <p:cNvSpPr>
-            <a:spLocks noGrp="1"/>
-          </p:cNvSpPr>
-          <p:nvPr>
-            <p:ph type="title"/>
-          </p:nvPr>
-        </p:nvSpPr>
-        <p:spPr>
-          <a:xfrm>
-            <a:off x="7278688" y="1013421"/>
-            <a:ext cx="3932237" cy="739074"/>
-          </a:xfrm>
-        </p:spPr>
-        <p:txBody>
-          <a:bodyPr>
-            <a:normAutofit fontScale="90000"/>
-          </a:bodyPr>
-          <a:lstStyle/>
-          <a:p>
-            <a:r>
-              <a:rPr lang="en-US" dirty="0"/>
-              <a:t>Levels of Biological Organization in the </a:t>
-            </a:r>
-            <a:r>
-              <a:rPr lang="en-US" dirty="0" err="1"/>
-              <a:t>AOPwiki</a:t>
-            </a:r>
-            <a:r>
-              <a:rPr lang="en-US" dirty="0"/>
-              <a:t> network</a:t>
-            </a:r>
-          </a:p>
-        </p:txBody>
-      </p:sp>
-      <p:sp>
-        <p:nvSpPr>
-          <p:cNvPr id="4" name="Text Placeholder 3"/>
-          <p:cNvSpPr>
-            <a:spLocks noGrp="1"/>
-          </p:cNvSpPr>
-          <p:nvPr>
-            <p:ph type="body" sz="half" idx="2"/>
-          </p:nvPr>
-        </p:nvSpPr>
-        <p:spPr>
-          <a:xfrm>
-            <a:off x="7323242" y="1766217"/>
-            <a:ext cx="3932237" cy="3811588"/>
-          </a:xfrm>
-        </p:spPr>
-        <p:txBody>
-          <a:bodyPr/>
-          <a:lstStyle/>
-          <a:p>
-            <a:r>
-              <a:rPr lang="en-US" dirty="0"/>
-              <a:t>Colors represent levels of biological organization associated to Key Events in the </a:t>
-            </a:r>
-            <a:r>
-              <a:rPr lang="en-US" dirty="0" err="1"/>
-              <a:t>AOPwiki</a:t>
-            </a:r>
-            <a:r>
-              <a:rPr lang="en-US" dirty="0"/>
-              <a:t>. A total of 750 unique key events are in the wiki, 53 Key events in the </a:t>
-            </a:r>
-            <a:r>
-              <a:rPr lang="en-US" dirty="0" err="1"/>
-              <a:t>AOPwiki</a:t>
-            </a:r>
-            <a:r>
-              <a:rPr lang="en-US" dirty="0"/>
-              <a:t> had unspecified levels of biological organization</a:t>
-            </a:r>
-          </a:p>
-        </p:txBody>
-      </p:sp>
       <p:pic>
         <p:nvPicPr>
-          <p:cNvPr id="24" name="Picture 23" descr="Screen Clipping"/>
+          <p:cNvPr id="3" name="Picture 2" descr="Screen Clipping"/>
           <p:cNvPicPr>
             <a:picLocks noChangeAspect="1"/>
           </p:cNvPicPr>
           <p:nvPr/>
         </p:nvPicPr>
         <p:blipFill>
-          <a:blip r:embed="rId5">
+          <a:blip r:embed="rId3">
             <a:extLst>
               <a:ext uri="{28A0092B-C50C-407E-A947-70E740481C1C}">
                 <a14:useLocalDpi xmlns:a14="http://schemas.microsoft.com/office/drawing/2010/main" val="0"/>
@@ -4087,8 +3734,558 @@
         </p:blipFill>
         <p:spPr>
           <a:xfrm>
-            <a:off x="5559881" y="4392970"/>
-            <a:ext cx="1644308" cy="2005558"/>
+            <a:off x="7425414" y="3141727"/>
+            <a:ext cx="3924299" cy="3424622"/>
+          </a:xfrm>
+          <a:prstGeom prst="rect">
+            <a:avLst/>
+          </a:prstGeom>
+        </p:spPr>
+      </p:pic>
+    </p:spTree>
+    <p:extLst>
+      <p:ext uri="{BB962C8B-B14F-4D97-AF65-F5344CB8AC3E}">
+        <p14:creationId xmlns:p14="http://schemas.microsoft.com/office/powerpoint/2010/main" val="4080610688"/>
+      </p:ext>
+    </p:extLst>
+  </p:cSld>
+  <p:clrMapOvr>
+    <a:masterClrMapping/>
+  </p:clrMapOvr>
+</p:sld>
+</file>
+
+<file path=ppt/slides/slide6.xml><?xml version="1.0" encoding="utf-8"?>
+<p:sld xmlns:a="http://schemas.openxmlformats.org/drawingml/2006/main" xmlns:r="http://schemas.openxmlformats.org/officeDocument/2006/relationships" xmlns:p="http://schemas.openxmlformats.org/presentationml/2006/main">
+  <p:cSld>
+    <p:spTree>
+      <p:nvGrpSpPr>
+        <p:cNvPr id="1" name=""/>
+        <p:cNvGrpSpPr/>
+        <p:nvPr/>
+      </p:nvGrpSpPr>
+      <p:grpSpPr>
+        <a:xfrm>
+          <a:off x="0" y="0"/>
+          <a:ext cx="0" cy="0"/>
+          <a:chOff x="0" y="0"/>
+          <a:chExt cx="0" cy="0"/>
+        </a:xfrm>
+      </p:grpSpPr>
+      <p:sp>
+        <p:nvSpPr>
+          <p:cNvPr id="2" name="Title 1"/>
+          <p:cNvSpPr>
+            <a:spLocks noGrp="1"/>
+          </p:cNvSpPr>
+          <p:nvPr>
+            <p:ph type="title"/>
+          </p:nvPr>
+        </p:nvSpPr>
+        <p:spPr/>
+        <p:txBody>
+          <a:bodyPr vert="horz" lIns="91440" tIns="45720" rIns="91440" bIns="45720" rtlCol="0" anchor="b">
+            <a:normAutofit fontScale="90000"/>
+          </a:bodyPr>
+          <a:lstStyle/>
+          <a:p>
+            <a:r>
+              <a:rPr lang="en-US" sz="4000" dirty="0"/>
+              <a:t>Components of the </a:t>
+            </a:r>
+            <a:r>
+              <a:rPr lang="en-US" sz="4000" dirty="0" err="1"/>
+              <a:t>AOPwiki</a:t>
+            </a:r>
+            <a:r>
+              <a:rPr lang="en-US" sz="4000" dirty="0"/>
+              <a:t> network</a:t>
+            </a:r>
+          </a:p>
+        </p:txBody>
+      </p:sp>
+      <p:sp>
+        <p:nvSpPr>
+          <p:cNvPr id="16" name="Text Placeholder 15"/>
+          <p:cNvSpPr>
+            <a:spLocks noGrp="1"/>
+          </p:cNvSpPr>
+          <p:nvPr>
+            <p:ph type="body" sz="half" idx="2"/>
+          </p:nvPr>
+        </p:nvSpPr>
+        <p:spPr/>
+        <p:txBody>
+          <a:bodyPr/>
+          <a:lstStyle/>
+          <a:p>
+            <a:r>
+              <a:rPr lang="en-US" dirty="0"/>
+              <a:t>A network diagram of the Adverse Outcome Pathway Wiki database of AOPs. </a:t>
+            </a:r>
+          </a:p>
+          <a:p>
+            <a:r>
+              <a:rPr lang="en-US" dirty="0"/>
+              <a:t>In this figure, colors highlight distinct strongly connected components.  Nodes within strongly connected components have a directed path to each other node in the network.</a:t>
+            </a:r>
+          </a:p>
+          <a:p>
+            <a:r>
+              <a:rPr lang="en-US" dirty="0"/>
+              <a:t>Within the AOP context, a strongly connected component highlights cycles or feedback loops between Key Events.</a:t>
+            </a:r>
+          </a:p>
+          <a:p>
+            <a:r>
+              <a:rPr lang="en-US" dirty="0"/>
+              <a:t>In the </a:t>
+            </a:r>
+            <a:r>
+              <a:rPr lang="en-US" dirty="0" err="1"/>
+              <a:t>AOPwiki</a:t>
+            </a:r>
+            <a:r>
+              <a:rPr lang="en-US" dirty="0"/>
+              <a:t> network there are 7 distinct cycles that emerge.</a:t>
+            </a:r>
+          </a:p>
+          <a:p>
+            <a:endParaRPr lang="en-US" dirty="0"/>
+          </a:p>
+          <a:p>
+            <a:endParaRPr lang="en-US" dirty="0"/>
+          </a:p>
+          <a:p>
+            <a:endParaRPr lang="en-US" dirty="0"/>
+          </a:p>
+          <a:p>
+            <a:endParaRPr lang="en-US" dirty="0"/>
+          </a:p>
+        </p:txBody>
+      </p:sp>
+      <p:pic>
+        <p:nvPicPr>
+          <p:cNvPr id="17" name="Content Placeholder 3" descr="Screen Clipping"/>
+          <p:cNvPicPr>
+            <a:picLocks noChangeAspect="1"/>
+          </p:cNvPicPr>
+          <p:nvPr/>
+        </p:nvPicPr>
+        <p:blipFill>
+          <a:blip r:embed="rId2">
+            <a:extLst>
+              <a:ext uri="{28A0092B-C50C-407E-A947-70E740481C1C}">
+                <a14:useLocalDpi xmlns:a14="http://schemas.microsoft.com/office/drawing/2010/main" val="0"/>
+              </a:ext>
+            </a:extLst>
+          </a:blip>
+          <a:stretch>
+            <a:fillRect/>
+          </a:stretch>
+        </p:blipFill>
+        <p:spPr>
+          <a:xfrm>
+            <a:off x="5429324" y="247593"/>
+            <a:ext cx="6598368" cy="6383919"/>
+          </a:xfrm>
+          <a:prstGeom prst="rect">
+            <a:avLst/>
+          </a:prstGeom>
+        </p:spPr>
+      </p:pic>
+      <p:pic>
+        <p:nvPicPr>
+          <p:cNvPr id="5" name="Content Placeholder 6" descr="Screen Clipping"/>
+          <p:cNvPicPr>
+            <a:picLocks noGrp="1" noChangeAspect="1"/>
+          </p:cNvPicPr>
+          <p:nvPr>
+            <p:ph idx="1"/>
+          </p:nvPr>
+        </p:nvPicPr>
+        <p:blipFill rotWithShape="1">
+          <a:blip r:embed="rId3">
+            <a:extLst>
+              <a:ext uri="{28A0092B-C50C-407E-A947-70E740481C1C}">
+                <a14:useLocalDpi xmlns:a14="http://schemas.microsoft.com/office/drawing/2010/main" val="0"/>
+              </a:ext>
+            </a:extLst>
+          </a:blip>
+          <a:srcRect b="2703"/>
+          <a:stretch/>
+        </p:blipFill>
+        <p:spPr>
+          <a:xfrm>
+            <a:off x="5143500" y="0"/>
+            <a:ext cx="7048500" cy="6858000"/>
+          </a:xfrm>
+        </p:spPr>
+      </p:pic>
+    </p:spTree>
+    <p:extLst>
+      <p:ext uri="{BB962C8B-B14F-4D97-AF65-F5344CB8AC3E}">
+        <p14:creationId xmlns:p14="http://schemas.microsoft.com/office/powerpoint/2010/main" val="1706549562"/>
+      </p:ext>
+    </p:extLst>
+  </p:cSld>
+  <p:clrMapOvr>
+    <a:masterClrMapping/>
+  </p:clrMapOvr>
+</p:sld>
+</file>
+
+<file path=ppt/slides/slide7.xml><?xml version="1.0" encoding="utf-8"?>
+<p:sld xmlns:a="http://schemas.openxmlformats.org/drawingml/2006/main" xmlns:r="http://schemas.openxmlformats.org/officeDocument/2006/relationships" xmlns:p="http://schemas.openxmlformats.org/presentationml/2006/main">
+  <p:cSld>
+    <p:spTree>
+      <p:nvGrpSpPr>
+        <p:cNvPr id="1" name=""/>
+        <p:cNvGrpSpPr/>
+        <p:nvPr/>
+      </p:nvGrpSpPr>
+      <p:grpSpPr>
+        <a:xfrm>
+          <a:off x="0" y="0"/>
+          <a:ext cx="0" cy="0"/>
+          <a:chOff x="0" y="0"/>
+          <a:chExt cx="0" cy="0"/>
+        </a:xfrm>
+      </p:grpSpPr>
+      <p:sp>
+        <p:nvSpPr>
+          <p:cNvPr id="2" name="Title 1"/>
+          <p:cNvSpPr>
+            <a:spLocks noGrp="1"/>
+          </p:cNvSpPr>
+          <p:nvPr>
+            <p:ph type="title"/>
+          </p:nvPr>
+        </p:nvSpPr>
+        <p:spPr>
+          <a:xfrm>
+            <a:off x="7278688" y="827501"/>
+            <a:ext cx="3932237" cy="739074"/>
+          </a:xfrm>
+        </p:spPr>
+        <p:txBody>
+          <a:bodyPr>
+            <a:normAutofit fontScale="90000"/>
+          </a:bodyPr>
+          <a:lstStyle/>
+          <a:p>
+            <a:r>
+              <a:rPr lang="en-US" dirty="0"/>
+              <a:t>Levels of Biological Organization in the </a:t>
+            </a:r>
+            <a:r>
+              <a:rPr lang="en-US" dirty="0" err="1"/>
+              <a:t>AOPwiki</a:t>
+            </a:r>
+            <a:r>
+              <a:rPr lang="en-US" dirty="0"/>
+              <a:t> network</a:t>
+            </a:r>
+          </a:p>
+        </p:txBody>
+      </p:sp>
+      <p:sp>
+        <p:nvSpPr>
+          <p:cNvPr id="4" name="Text Placeholder 3"/>
+          <p:cNvSpPr>
+            <a:spLocks noGrp="1"/>
+          </p:cNvSpPr>
+          <p:nvPr>
+            <p:ph type="body" sz="half" idx="2"/>
+          </p:nvPr>
+        </p:nvSpPr>
+        <p:spPr>
+          <a:xfrm>
+            <a:off x="7278688" y="1566575"/>
+            <a:ext cx="3932237" cy="3811588"/>
+          </a:xfrm>
+        </p:spPr>
+        <p:txBody>
+          <a:bodyPr/>
+          <a:lstStyle/>
+          <a:p>
+            <a:r>
+              <a:rPr lang="en-US" dirty="0"/>
+              <a:t>Colors represent levels of biological organization associated to Key Events in the </a:t>
+            </a:r>
+            <a:r>
+              <a:rPr lang="en-US" dirty="0" err="1"/>
+              <a:t>AOPwiki</a:t>
+            </a:r>
+            <a:r>
+              <a:rPr lang="en-US" dirty="0"/>
+              <a:t>. A total of 750 unique key events are in the wiki, 53 Key events in the </a:t>
+            </a:r>
+            <a:r>
+              <a:rPr lang="en-US" dirty="0" err="1"/>
+              <a:t>AOPwiki</a:t>
+            </a:r>
+            <a:r>
+              <a:rPr lang="en-US" dirty="0"/>
+              <a:t> had unspecified levels of biological organization.  </a:t>
+            </a:r>
+          </a:p>
+        </p:txBody>
+      </p:sp>
+      <p:pic>
+        <p:nvPicPr>
+          <p:cNvPr id="21" name="Picture 20" descr="Screen Clipping"/>
+          <p:cNvPicPr>
+            <a:picLocks noChangeAspect="1"/>
+          </p:cNvPicPr>
+          <p:nvPr/>
+        </p:nvPicPr>
+        <p:blipFill>
+          <a:blip r:embed="rId2">
+            <a:extLst>
+              <a:ext uri="{28A0092B-C50C-407E-A947-70E740481C1C}">
+                <a14:useLocalDpi xmlns:a14="http://schemas.microsoft.com/office/drawing/2010/main" val="0"/>
+              </a:ext>
+            </a:extLst>
+          </a:blip>
+          <a:stretch>
+            <a:fillRect/>
+          </a:stretch>
+        </p:blipFill>
+        <p:spPr>
+          <a:xfrm>
+            <a:off x="0" y="61373"/>
+            <a:ext cx="6834368" cy="6643560"/>
+          </a:xfrm>
+          <a:prstGeom prst="rect">
+            <a:avLst/>
+          </a:prstGeom>
+        </p:spPr>
+      </p:pic>
+      <p:pic>
+        <p:nvPicPr>
+          <p:cNvPr id="23" name="Picture 22" descr="Screen Clipping"/>
+          <p:cNvPicPr>
+            <a:picLocks noChangeAspect="1"/>
+          </p:cNvPicPr>
+          <p:nvPr/>
+        </p:nvPicPr>
+        <p:blipFill>
+          <a:blip r:embed="rId3">
+            <a:extLst>
+              <a:ext uri="{28A0092B-C50C-407E-A947-70E740481C1C}">
+                <a14:useLocalDpi xmlns:a14="http://schemas.microsoft.com/office/drawing/2010/main" val="0"/>
+              </a:ext>
+            </a:extLst>
+          </a:blip>
+          <a:stretch>
+            <a:fillRect/>
+          </a:stretch>
+        </p:blipFill>
+        <p:spPr>
+          <a:xfrm>
+            <a:off x="7278688" y="3472369"/>
+            <a:ext cx="2543210" cy="2559833"/>
+          </a:xfrm>
+          <a:prstGeom prst="rect">
+            <a:avLst/>
+          </a:prstGeom>
+        </p:spPr>
+      </p:pic>
+    </p:spTree>
+    <p:extLst>
+      <p:ext uri="{BB962C8B-B14F-4D97-AF65-F5344CB8AC3E}">
+        <p14:creationId xmlns:p14="http://schemas.microsoft.com/office/powerpoint/2010/main" val="4067574351"/>
+      </p:ext>
+    </p:extLst>
+  </p:cSld>
+  <p:clrMapOvr>
+    <a:masterClrMapping/>
+  </p:clrMapOvr>
+</p:sld>
+</file>
+
+<file path=ppt/slides/slide8.xml><?xml version="1.0" encoding="utf-8"?>
+<p:sld xmlns:a="http://schemas.openxmlformats.org/drawingml/2006/main" xmlns:r="http://schemas.openxmlformats.org/officeDocument/2006/relationships" xmlns:p="http://schemas.openxmlformats.org/presentationml/2006/main">
+  <p:cSld>
+    <p:spTree>
+      <p:nvGrpSpPr>
+        <p:cNvPr id="1" name=""/>
+        <p:cNvGrpSpPr/>
+        <p:nvPr/>
+      </p:nvGrpSpPr>
+      <p:grpSpPr>
+        <a:xfrm>
+          <a:off x="0" y="0"/>
+          <a:ext cx="0" cy="0"/>
+          <a:chOff x="0" y="0"/>
+          <a:chExt cx="0" cy="0"/>
+        </a:xfrm>
+      </p:grpSpPr>
+      <p:sp>
+        <p:nvSpPr>
+          <p:cNvPr id="2" name="Title 1"/>
+          <p:cNvSpPr>
+            <a:spLocks noGrp="1"/>
+          </p:cNvSpPr>
+          <p:nvPr>
+            <p:ph type="title"/>
+          </p:nvPr>
+        </p:nvSpPr>
+        <p:spPr>
+          <a:xfrm>
+            <a:off x="7278688" y="827501"/>
+            <a:ext cx="3932237" cy="739074"/>
+          </a:xfrm>
+        </p:spPr>
+        <p:txBody>
+          <a:bodyPr>
+            <a:normAutofit fontScale="90000"/>
+          </a:bodyPr>
+          <a:lstStyle/>
+          <a:p>
+            <a:r>
+              <a:rPr lang="en-US" dirty="0"/>
+              <a:t>Levels of Biological Organization in the </a:t>
+            </a:r>
+            <a:r>
+              <a:rPr lang="en-US" dirty="0" err="1"/>
+              <a:t>AOPwiki</a:t>
+            </a:r>
+            <a:r>
+              <a:rPr lang="en-US" dirty="0"/>
+              <a:t> network</a:t>
+            </a:r>
+          </a:p>
+        </p:txBody>
+      </p:sp>
+      <p:sp>
+        <p:nvSpPr>
+          <p:cNvPr id="4" name="Text Placeholder 3"/>
+          <p:cNvSpPr>
+            <a:spLocks noGrp="1"/>
+          </p:cNvSpPr>
+          <p:nvPr>
+            <p:ph type="body" sz="half" idx="2"/>
+          </p:nvPr>
+        </p:nvSpPr>
+        <p:spPr>
+          <a:xfrm>
+            <a:off x="7278688" y="1566575"/>
+            <a:ext cx="3932237" cy="3811588"/>
+          </a:xfrm>
+        </p:spPr>
+        <p:txBody>
+          <a:bodyPr/>
+          <a:lstStyle/>
+          <a:p>
+            <a:r>
+              <a:rPr lang="en-US" dirty="0"/>
+              <a:t>Colors represent levels of biological organization associated to Key Events in the </a:t>
+            </a:r>
+            <a:r>
+              <a:rPr lang="en-US" dirty="0" err="1"/>
+              <a:t>AOPwiki</a:t>
+            </a:r>
+            <a:r>
+              <a:rPr lang="en-US" dirty="0"/>
+              <a:t>. A total of 750 unique key events are in the wiki, 53 Key events in the </a:t>
+            </a:r>
+            <a:r>
+              <a:rPr lang="en-US" dirty="0" err="1"/>
+              <a:t>AOPwiki</a:t>
+            </a:r>
+            <a:r>
+              <a:rPr lang="en-US" dirty="0"/>
+              <a:t> had unspecified levels of biological organization</a:t>
+            </a:r>
+          </a:p>
+        </p:txBody>
+      </p:sp>
+      <p:pic>
+        <p:nvPicPr>
+          <p:cNvPr id="21" name="Picture 20" descr="Screen Clipping"/>
+          <p:cNvPicPr>
+            <a:picLocks noChangeAspect="1"/>
+          </p:cNvPicPr>
+          <p:nvPr/>
+        </p:nvPicPr>
+        <p:blipFill>
+          <a:blip r:embed="rId2">
+            <a:extLst>
+              <a:ext uri="{28A0092B-C50C-407E-A947-70E740481C1C}">
+                <a14:useLocalDpi xmlns:a14="http://schemas.microsoft.com/office/drawing/2010/main" val="0"/>
+              </a:ext>
+            </a:extLst>
+          </a:blip>
+          <a:stretch>
+            <a:fillRect/>
+          </a:stretch>
+        </p:blipFill>
+        <p:spPr>
+          <a:xfrm>
+            <a:off x="0" y="61373"/>
+            <a:ext cx="6834368" cy="6643560"/>
+          </a:xfrm>
+          <a:prstGeom prst="rect">
+            <a:avLst/>
+          </a:prstGeom>
+        </p:spPr>
+      </p:pic>
+      <p:pic>
+        <p:nvPicPr>
+          <p:cNvPr id="26" name="Picture 25" descr="Screen Clipping"/>
+          <p:cNvPicPr>
+            <a:picLocks noChangeAspect="1"/>
+          </p:cNvPicPr>
+          <p:nvPr/>
+        </p:nvPicPr>
+        <p:blipFill>
+          <a:blip r:embed="rId3">
+            <a:extLst>
+              <a:ext uri="{28A0092B-C50C-407E-A947-70E740481C1C}">
+                <a14:useLocalDpi xmlns:a14="http://schemas.microsoft.com/office/drawing/2010/main" val="0"/>
+              </a:ext>
+            </a:extLst>
+          </a:blip>
+          <a:stretch>
+            <a:fillRect/>
+          </a:stretch>
+        </p:blipFill>
+        <p:spPr>
+          <a:xfrm>
+            <a:off x="7336342" y="2824842"/>
+            <a:ext cx="2960192" cy="3880091"/>
+          </a:xfrm>
+          <a:prstGeom prst="rect">
+            <a:avLst/>
+          </a:prstGeom>
+        </p:spPr>
+      </p:pic>
+      <p:pic>
+        <p:nvPicPr>
+          <p:cNvPr id="23" name="Picture 22" descr="Screen Clipping"/>
+          <p:cNvPicPr>
+            <a:picLocks noChangeAspect="1"/>
+          </p:cNvPicPr>
+          <p:nvPr/>
+        </p:nvPicPr>
+        <p:blipFill>
+          <a:blip r:embed="rId4">
+            <a:extLst>
+              <a:ext uri="{28A0092B-C50C-407E-A947-70E740481C1C}">
+                <a14:useLocalDpi xmlns:a14="http://schemas.microsoft.com/office/drawing/2010/main" val="0"/>
+              </a:ext>
+            </a:extLst>
+          </a:blip>
+          <a:stretch>
+            <a:fillRect/>
+          </a:stretch>
+        </p:blipFill>
+        <p:spPr>
+          <a:xfrm>
+            <a:off x="9334946" y="2824842"/>
+            <a:ext cx="1745376" cy="1756784"/>
           </a:xfrm>
           <a:prstGeom prst="rect">
             <a:avLst/>
@@ -4099,6 +4296,225 @@
     <p:extLst>
       <p:ext uri="{BB962C8B-B14F-4D97-AF65-F5344CB8AC3E}">
         <p14:creationId xmlns:p14="http://schemas.microsoft.com/office/powerpoint/2010/main" val="1569041523"/>
+      </p:ext>
+    </p:extLst>
+  </p:cSld>
+  <p:clrMapOvr>
+    <a:masterClrMapping/>
+  </p:clrMapOvr>
+  <mc:AlternateContent xmlns:mc="http://schemas.openxmlformats.org/markup-compatibility/2006">
+    <mc:Choice xmlns:p159="http://schemas.microsoft.com/office/powerpoint/2015/09/main" Requires="p159">
+      <p:transition xmlns:p14="http://schemas.microsoft.com/office/powerpoint/2010/main" spd="slow" p14:dur="2000">
+        <p159:morph option="byObject"/>
+      </p:transition>
+    </mc:Choice>
+    <mc:Fallback>
+      <p:transition spd="slow">
+        <p:fade/>
+      </p:transition>
+    </mc:Fallback>
+  </mc:AlternateContent>
+</p:sld>
+</file>
+
+<file path=ppt/slides/slide9.xml><?xml version="1.0" encoding="utf-8"?>
+<p:sld xmlns:a="http://schemas.openxmlformats.org/drawingml/2006/main" xmlns:r="http://schemas.openxmlformats.org/officeDocument/2006/relationships" xmlns:p="http://schemas.openxmlformats.org/presentationml/2006/main">
+  <p:cSld>
+    <p:spTree>
+      <p:nvGrpSpPr>
+        <p:cNvPr id="1" name=""/>
+        <p:cNvGrpSpPr/>
+        <p:nvPr/>
+      </p:nvGrpSpPr>
+      <p:grpSpPr>
+        <a:xfrm>
+          <a:off x="0" y="0"/>
+          <a:ext cx="0" cy="0"/>
+          <a:chOff x="0" y="0"/>
+          <a:chExt cx="0" cy="0"/>
+        </a:xfrm>
+      </p:grpSpPr>
+      <p:sp>
+        <p:nvSpPr>
+          <p:cNvPr id="2" name="Title 1"/>
+          <p:cNvSpPr>
+            <a:spLocks noGrp="1"/>
+          </p:cNvSpPr>
+          <p:nvPr>
+            <p:ph type="title"/>
+          </p:nvPr>
+        </p:nvSpPr>
+        <p:spPr/>
+        <p:txBody>
+          <a:bodyPr vert="horz" lIns="91440" tIns="45720" rIns="91440" bIns="45720" rtlCol="0" anchor="b">
+            <a:normAutofit fontScale="90000"/>
+          </a:bodyPr>
+          <a:lstStyle/>
+          <a:p>
+            <a:r>
+              <a:rPr lang="en-US" sz="4000" dirty="0"/>
+              <a:t>Centrality Measures in the </a:t>
+            </a:r>
+            <a:r>
+              <a:rPr lang="en-US" sz="4000" dirty="0" err="1"/>
+              <a:t>AOPwiki</a:t>
+            </a:r>
+            <a:r>
+              <a:rPr lang="en-US" sz="4000" dirty="0"/>
+              <a:t> network</a:t>
+            </a:r>
+          </a:p>
+        </p:txBody>
+      </p:sp>
+      <p:sp>
+        <p:nvSpPr>
+          <p:cNvPr id="16" name="Text Placeholder 15"/>
+          <p:cNvSpPr>
+            <a:spLocks noGrp="1"/>
+          </p:cNvSpPr>
+          <p:nvPr>
+            <p:ph type="body" sz="half" idx="2"/>
+          </p:nvPr>
+        </p:nvSpPr>
+        <p:spPr/>
+        <p:txBody>
+          <a:bodyPr/>
+          <a:lstStyle/>
+          <a:p>
+            <a:r>
+              <a:rPr lang="en-US" dirty="0"/>
+              <a:t>The degree of a node is the number of adjacent edges.  In this case, the key event with the highest </a:t>
+            </a:r>
+            <a:r>
+              <a:rPr lang="en-US" dirty="0">
+                <a:solidFill>
+                  <a:srgbClr val="0070C0"/>
+                </a:solidFill>
+              </a:rPr>
+              <a:t>degree</a:t>
+            </a:r>
+            <a:r>
+              <a:rPr lang="en-US" dirty="0"/>
+              <a:t> is </a:t>
+            </a:r>
+            <a:r>
+              <a:rPr lang="en-US" i="1" dirty="0"/>
+              <a:t>Increased oxidative stress, </a:t>
+            </a:r>
+            <a:r>
+              <a:rPr lang="en-US" dirty="0"/>
+              <a:t>with 22 incident edges. </a:t>
+            </a:r>
+          </a:p>
+          <a:p>
+            <a:r>
+              <a:rPr lang="en-US" i="1" dirty="0"/>
+              <a:t>Increased oxidative stress </a:t>
+            </a:r>
+            <a:r>
+              <a:rPr lang="en-US" dirty="0"/>
+              <a:t>is also the key event with the highest </a:t>
+            </a:r>
+            <a:r>
+              <a:rPr lang="en-US" dirty="0">
+                <a:solidFill>
+                  <a:srgbClr val="00FF00"/>
+                </a:solidFill>
+              </a:rPr>
+              <a:t>betweenness</a:t>
+            </a:r>
+            <a:r>
+              <a:rPr lang="en-US" dirty="0"/>
+              <a:t> value, meaning that in the </a:t>
+            </a:r>
+            <a:r>
+              <a:rPr lang="en-US" dirty="0" err="1"/>
+              <a:t>AOPwiki</a:t>
+            </a:r>
+            <a:r>
+              <a:rPr lang="en-US" dirty="0"/>
+              <a:t>, from a non-directed standpoint, it has the most shortest paths between other nodes that travel through it.</a:t>
+            </a:r>
+          </a:p>
+          <a:p>
+            <a:r>
+              <a:rPr lang="en-US" dirty="0"/>
+              <a:t>When it comes to </a:t>
+            </a:r>
+            <a:r>
+              <a:rPr lang="en-US" dirty="0">
+                <a:solidFill>
+                  <a:srgbClr val="A020F0"/>
+                </a:solidFill>
+              </a:rPr>
+              <a:t>closeness</a:t>
+            </a:r>
+            <a:r>
+              <a:rPr lang="en-US" dirty="0"/>
+              <a:t> however, which is a measure of distance between nodes on those shortest paths, </a:t>
+            </a:r>
+            <a:r>
+              <a:rPr lang="en-US" i="1" dirty="0"/>
+              <a:t>Suppression, Constitutive </a:t>
+            </a:r>
+            <a:r>
+              <a:rPr lang="en-US" i="1" dirty="0" err="1"/>
+              <a:t>androstane</a:t>
+            </a:r>
+            <a:r>
+              <a:rPr lang="en-US" i="1" dirty="0"/>
+              <a:t> receptor, NR1l3, </a:t>
+            </a:r>
+            <a:r>
+              <a:rPr lang="en-US" dirty="0"/>
+              <a:t>is the closest.</a:t>
+            </a:r>
+            <a:endParaRPr lang="en-US" i="1" dirty="0"/>
+          </a:p>
+          <a:p>
+            <a:endParaRPr lang="en-US" dirty="0"/>
+          </a:p>
+          <a:p>
+            <a:endParaRPr lang="en-US" dirty="0"/>
+          </a:p>
+          <a:p>
+            <a:endParaRPr lang="en-US" dirty="0"/>
+          </a:p>
+        </p:txBody>
+      </p:sp>
+      <p:pic>
+        <p:nvPicPr>
+          <p:cNvPr id="7" name="Content Placeholder 6" descr="Screen Clipping"/>
+          <p:cNvPicPr>
+            <a:picLocks noGrp="1" noChangeAspect="1"/>
+          </p:cNvPicPr>
+          <p:nvPr>
+            <p:ph idx="1"/>
+          </p:nvPr>
+        </p:nvPicPr>
+        <p:blipFill>
+          <a:blip r:embed="rId2">
+            <a:extLst>
+              <a:ext uri="{28A0092B-C50C-407E-A947-70E740481C1C}">
+                <a14:useLocalDpi xmlns:a14="http://schemas.microsoft.com/office/drawing/2010/main" val="0"/>
+              </a:ext>
+            </a:extLst>
+          </a:blip>
+          <a:stretch>
+            <a:fillRect/>
+          </a:stretch>
+        </p:blipFill>
+        <p:spPr>
+          <a:xfrm>
+            <a:off x="5340250" y="0"/>
+            <a:ext cx="6851750" cy="6751392"/>
+          </a:xfrm>
+        </p:spPr>
+      </p:pic>
+    </p:spTree>
+    <p:extLst>
+      <p:ext uri="{BB962C8B-B14F-4D97-AF65-F5344CB8AC3E}">
+        <p14:creationId xmlns:p14="http://schemas.microsoft.com/office/powerpoint/2010/main" val="1782567557"/>
       </p:ext>
     </p:extLst>
   </p:cSld>

</xml_diff>

<commit_message>
Data files and R file added for thy and aro AOPNs
</commit_message>
<xml_diff>
--- a/AOPwiki_analysis_ccs.pptx
+++ b/AOPwiki_analysis_ccs.pptx
@@ -15,6 +15,7 @@
     <p:sldId id="265" r:id="rId9"/>
     <p:sldId id="262" r:id="rId10"/>
     <p:sldId id="263" r:id="rId11"/>
+    <p:sldId id="269" r:id="rId12"/>
   </p:sldIdLst>
   <p:sldSz cx="12192000" cy="6858000"/>
   <p:notesSz cx="6858000" cy="9144000"/>
@@ -128,6 +129,7 @@
             <p14:sldId id="265"/>
             <p14:sldId id="262"/>
             <p14:sldId id="263"/>
+            <p14:sldId id="269"/>
           </p14:sldIdLst>
         </p14:section>
       </p14:sectionLst>
@@ -270,7 +272,7 @@
           <a:p>
             <a:fld id="{C71581C8-DC5B-4BAA-A235-D61CE073C796}" type="datetimeFigureOut">
               <a:rPr lang="en-US" smtClean="0"/>
-              <a:t>5/18/2017</a:t>
+              <a:t>5/22/2017</a:t>
             </a:fld>
             <a:endParaRPr lang="en-US"/>
           </a:p>
@@ -445,7 +447,7 @@
           <a:p>
             <a:fld id="{C71581C8-DC5B-4BAA-A235-D61CE073C796}" type="datetimeFigureOut">
               <a:rPr lang="en-US" smtClean="0"/>
-              <a:t>5/18/2017</a:t>
+              <a:t>5/22/2017</a:t>
             </a:fld>
             <a:endParaRPr lang="en-US"/>
           </a:p>
@@ -625,7 +627,7 @@
           <a:p>
             <a:fld id="{C71581C8-DC5B-4BAA-A235-D61CE073C796}" type="datetimeFigureOut">
               <a:rPr lang="en-US" smtClean="0"/>
-              <a:t>5/18/2017</a:t>
+              <a:t>5/22/2017</a:t>
             </a:fld>
             <a:endParaRPr lang="en-US"/>
           </a:p>
@@ -800,7 +802,7 @@
           <a:p>
             <a:fld id="{C71581C8-DC5B-4BAA-A235-D61CE073C796}" type="datetimeFigureOut">
               <a:rPr lang="en-US" smtClean="0"/>
-              <a:t>5/18/2017</a:t>
+              <a:t>5/22/2017</a:t>
             </a:fld>
             <a:endParaRPr lang="en-US"/>
           </a:p>
@@ -1046,7 +1048,7 @@
           <a:p>
             <a:fld id="{C71581C8-DC5B-4BAA-A235-D61CE073C796}" type="datetimeFigureOut">
               <a:rPr lang="en-US" smtClean="0"/>
-              <a:t>5/18/2017</a:t>
+              <a:t>5/22/2017</a:t>
             </a:fld>
             <a:endParaRPr lang="en-US"/>
           </a:p>
@@ -1283,7 +1285,7 @@
           <a:p>
             <a:fld id="{C71581C8-DC5B-4BAA-A235-D61CE073C796}" type="datetimeFigureOut">
               <a:rPr lang="en-US" smtClean="0"/>
-              <a:t>5/18/2017</a:t>
+              <a:t>5/22/2017</a:t>
             </a:fld>
             <a:endParaRPr lang="en-US"/>
           </a:p>
@@ -1650,7 +1652,7 @@
           <a:p>
             <a:fld id="{C71581C8-DC5B-4BAA-A235-D61CE073C796}" type="datetimeFigureOut">
               <a:rPr lang="en-US" smtClean="0"/>
-              <a:t>5/18/2017</a:t>
+              <a:t>5/22/2017</a:t>
             </a:fld>
             <a:endParaRPr lang="en-US"/>
           </a:p>
@@ -1768,7 +1770,7 @@
           <a:p>
             <a:fld id="{C71581C8-DC5B-4BAA-A235-D61CE073C796}" type="datetimeFigureOut">
               <a:rPr lang="en-US" smtClean="0"/>
-              <a:t>5/18/2017</a:t>
+              <a:t>5/22/2017</a:t>
             </a:fld>
             <a:endParaRPr lang="en-US"/>
           </a:p>
@@ -1863,7 +1865,7 @@
           <a:p>
             <a:fld id="{C71581C8-DC5B-4BAA-A235-D61CE073C796}" type="datetimeFigureOut">
               <a:rPr lang="en-US" smtClean="0"/>
-              <a:t>5/18/2017</a:t>
+              <a:t>5/22/2017</a:t>
             </a:fld>
             <a:endParaRPr lang="en-US"/>
           </a:p>
@@ -2140,7 +2142,7 @@
           <a:p>
             <a:fld id="{C71581C8-DC5B-4BAA-A235-D61CE073C796}" type="datetimeFigureOut">
               <a:rPr lang="en-US" smtClean="0"/>
-              <a:t>5/18/2017</a:t>
+              <a:t>5/22/2017</a:t>
             </a:fld>
             <a:endParaRPr lang="en-US"/>
           </a:p>
@@ -2397,7 +2399,7 @@
           <a:p>
             <a:fld id="{C71581C8-DC5B-4BAA-A235-D61CE073C796}" type="datetimeFigureOut">
               <a:rPr lang="en-US" smtClean="0"/>
-              <a:t>5/18/2017</a:t>
+              <a:t>5/22/2017</a:t>
             </a:fld>
             <a:endParaRPr lang="en-US"/>
           </a:p>
@@ -2610,7 +2612,7 @@
           <a:p>
             <a:fld id="{C71581C8-DC5B-4BAA-A235-D61CE073C796}" type="datetimeFigureOut">
               <a:rPr lang="en-US" smtClean="0"/>
-              <a:t>5/18/2017</a:t>
+              <a:t>5/22/2017</a:t>
             </a:fld>
             <a:endParaRPr lang="en-US"/>
           </a:p>
@@ -3266,6 +3268,195 @@
 </p:sld>
 </file>
 
+<file path=ppt/slides/slide11.xml><?xml version="1.0" encoding="utf-8"?>
+<p:sld xmlns:a="http://schemas.openxmlformats.org/drawingml/2006/main" xmlns:r="http://schemas.openxmlformats.org/officeDocument/2006/relationships" xmlns:p="http://schemas.openxmlformats.org/presentationml/2006/main">
+  <p:cSld>
+    <p:spTree>
+      <p:nvGrpSpPr>
+        <p:cNvPr id="1" name=""/>
+        <p:cNvGrpSpPr/>
+        <p:nvPr/>
+      </p:nvGrpSpPr>
+      <p:grpSpPr>
+        <a:xfrm>
+          <a:off x="0" y="0"/>
+          <a:ext cx="0" cy="0"/>
+          <a:chOff x="0" y="0"/>
+          <a:chExt cx="0" cy="0"/>
+        </a:xfrm>
+      </p:grpSpPr>
+      <p:sp>
+        <p:nvSpPr>
+          <p:cNvPr id="2" name="Title 1"/>
+          <p:cNvSpPr>
+            <a:spLocks noGrp="1"/>
+          </p:cNvSpPr>
+          <p:nvPr>
+            <p:ph type="title"/>
+          </p:nvPr>
+        </p:nvSpPr>
+        <p:spPr>
+          <a:xfrm>
+            <a:off x="7278688" y="827501"/>
+            <a:ext cx="3932237" cy="739074"/>
+          </a:xfrm>
+        </p:spPr>
+        <p:txBody>
+          <a:bodyPr>
+            <a:normAutofit fontScale="90000"/>
+          </a:bodyPr>
+          <a:lstStyle/>
+          <a:p>
+            <a:r>
+              <a:rPr lang="en-US" dirty="0"/>
+              <a:t>Degree centrality </a:t>
+            </a:r>
+            <a:r>
+              <a:rPr lang="en-US" dirty="0" err="1"/>
+              <a:t>heatmap</a:t>
+            </a:r>
+            <a:endParaRPr lang="en-US" dirty="0"/>
+          </a:p>
+        </p:txBody>
+      </p:sp>
+      <p:sp>
+        <p:nvSpPr>
+          <p:cNvPr id="4" name="Text Placeholder 3"/>
+          <p:cNvSpPr>
+            <a:spLocks noGrp="1"/>
+          </p:cNvSpPr>
+          <p:nvPr>
+            <p:ph type="body" sz="half" idx="2"/>
+          </p:nvPr>
+        </p:nvSpPr>
+        <p:spPr>
+          <a:xfrm>
+            <a:off x="7278688" y="1566575"/>
+            <a:ext cx="3932237" cy="3811588"/>
+          </a:xfrm>
+        </p:spPr>
+        <p:txBody>
+          <a:bodyPr/>
+          <a:lstStyle/>
+          <a:p>
+            <a:r>
+              <a:rPr lang="en-US" dirty="0"/>
+              <a:t>The degree of a node is the number of adjacent edges.  In this case, the key event with the highest degree is </a:t>
+            </a:r>
+            <a:r>
+              <a:rPr lang="en-US" i="1" dirty="0"/>
+              <a:t>Increased oxidative stress, </a:t>
+            </a:r>
+            <a:r>
+              <a:rPr lang="en-US" dirty="0"/>
+              <a:t>with 22 incident edges. Degree distribution is given below.</a:t>
+            </a:r>
+          </a:p>
+        </p:txBody>
+      </p:sp>
+      <p:pic>
+        <p:nvPicPr>
+          <p:cNvPr id="21" name="Picture 20" descr="Screen Clipping"/>
+          <p:cNvPicPr>
+            <a:picLocks noChangeAspect="1"/>
+          </p:cNvPicPr>
+          <p:nvPr/>
+        </p:nvPicPr>
+        <p:blipFill>
+          <a:blip r:embed="rId2">
+            <a:extLst>
+              <a:ext uri="{28A0092B-C50C-407E-A947-70E740481C1C}">
+                <a14:useLocalDpi xmlns:a14="http://schemas.microsoft.com/office/drawing/2010/main" val="0"/>
+              </a:ext>
+            </a:extLst>
+          </a:blip>
+          <a:stretch>
+            <a:fillRect/>
+          </a:stretch>
+        </p:blipFill>
+        <p:spPr>
+          <a:xfrm>
+            <a:off x="0" y="61373"/>
+            <a:ext cx="6834368" cy="6643560"/>
+          </a:xfrm>
+          <a:prstGeom prst="rect">
+            <a:avLst/>
+          </a:prstGeom>
+        </p:spPr>
+      </p:pic>
+      <p:pic>
+        <p:nvPicPr>
+          <p:cNvPr id="3" name="Picture 2" descr="Screen Clipping"/>
+          <p:cNvPicPr>
+            <a:picLocks noChangeAspect="1"/>
+          </p:cNvPicPr>
+          <p:nvPr/>
+        </p:nvPicPr>
+        <p:blipFill>
+          <a:blip r:embed="rId3">
+            <a:extLst>
+              <a:ext uri="{28A0092B-C50C-407E-A947-70E740481C1C}">
+                <a14:useLocalDpi xmlns:a14="http://schemas.microsoft.com/office/drawing/2010/main" val="0"/>
+              </a:ext>
+            </a:extLst>
+          </a:blip>
+          <a:stretch>
+            <a:fillRect/>
+          </a:stretch>
+        </p:blipFill>
+        <p:spPr>
+          <a:xfrm>
+            <a:off x="45150" y="37148"/>
+            <a:ext cx="7011378" cy="6820852"/>
+          </a:xfrm>
+          <a:prstGeom prst="rect">
+            <a:avLst/>
+          </a:prstGeom>
+        </p:spPr>
+      </p:pic>
+      <p:pic>
+        <p:nvPicPr>
+          <p:cNvPr id="5" name="Picture 4" descr="Screen Clipping"/>
+          <p:cNvPicPr>
+            <a:picLocks noChangeAspect="1"/>
+          </p:cNvPicPr>
+          <p:nvPr/>
+        </p:nvPicPr>
+        <p:blipFill>
+          <a:blip r:embed="rId4">
+            <a:extLst>
+              <a:ext uri="{28A0092B-C50C-407E-A947-70E740481C1C}">
+                <a14:useLocalDpi xmlns:a14="http://schemas.microsoft.com/office/drawing/2010/main" val="0"/>
+              </a:ext>
+            </a:extLst>
+          </a:blip>
+          <a:stretch>
+            <a:fillRect/>
+          </a:stretch>
+        </p:blipFill>
+        <p:spPr>
+          <a:xfrm>
+            <a:off x="7056528" y="2822028"/>
+            <a:ext cx="4418947" cy="4035972"/>
+          </a:xfrm>
+          <a:prstGeom prst="rect">
+            <a:avLst/>
+          </a:prstGeom>
+        </p:spPr>
+      </p:pic>
+    </p:spTree>
+    <p:extLst>
+      <p:ext uri="{BB962C8B-B14F-4D97-AF65-F5344CB8AC3E}">
+        <p14:creationId xmlns:p14="http://schemas.microsoft.com/office/powerpoint/2010/main" val="2372188515"/>
+      </p:ext>
+    </p:extLst>
+  </p:cSld>
+  <p:clrMapOvr>
+    <a:masterClrMapping/>
+  </p:clrMapOvr>
+</p:sld>
+</file>
+
 <file path=ppt/slides/slide2.xml><?xml version="1.0" encoding="utf-8"?>
 <p:sld xmlns:a="http://schemas.openxmlformats.org/drawingml/2006/main" xmlns:r="http://schemas.openxmlformats.org/officeDocument/2006/relationships" xmlns:p="http://schemas.openxmlformats.org/presentationml/2006/main">
   <p:cSld>

</xml_diff>